<commit_message>
[DEVGUIDE] Added UML outline for sort command
</commit_message>
<xml_diff>
--- a/docs/diagrams/SortCommandDiagrams.pptx
+++ b/docs/diagrams/SortCommandDiagrams.pptx
@@ -5,11 +5,12 @@
     <p:sldMasterId id="2147483672" r:id="rId1"/>
   </p:sldMasterIdLst>
   <p:notesMasterIdLst>
-    <p:notesMasterId r:id="rId4"/>
+    <p:notesMasterId r:id="rId5"/>
   </p:notesMasterIdLst>
   <p:sldIdLst>
     <p:sldId id="256" r:id="rId2"/>
-    <p:sldId id="257" r:id="rId3"/>
+    <p:sldId id="258" r:id="rId3"/>
+    <p:sldId id="257" r:id="rId4"/>
   </p:sldIdLst>
   <p:sldSz cx="12192000" cy="6858000"/>
   <p:notesSz cx="6858000" cy="9144000"/>
@@ -198,7 +199,7 @@
           <a:p>
             <a:fld id="{756A9B74-E80F-5C4E-A7DD-E49C20F7C5ED}" type="datetimeFigureOut">
               <a:rPr lang="en-US" smtClean="0"/>
-              <a:t>10/15/17</a:t>
+              <a:t>10/28/17</a:t>
             </a:fld>
             <a:endParaRPr lang="en-US"/>
           </a:p>
@@ -531,7 +532,7 @@
           <a:p>
             <a:fld id="{63641540-B136-3643-A0E1-762732219D5B}" type="slidenum">
               <a:rPr lang="en-US" smtClean="0"/>
-              <a:t>2</a:t>
+              <a:t>3</a:t>
             </a:fld>
             <a:endParaRPr lang="en-US"/>
           </a:p>
@@ -681,7 +682,7 @@
           <a:p>
             <a:fld id="{4C707D6F-0D04-EC44-A702-F7C7F0C5C2B0}" type="datetimeFigureOut">
               <a:rPr lang="en-US" smtClean="0"/>
-              <a:t>10/15/17</a:t>
+              <a:t>10/28/17</a:t>
             </a:fld>
             <a:endParaRPr lang="en-US"/>
           </a:p>
@@ -846,7 +847,7 @@
           <a:p>
             <a:fld id="{4C707D6F-0D04-EC44-A702-F7C7F0C5C2B0}" type="datetimeFigureOut">
               <a:rPr lang="en-US" smtClean="0"/>
-              <a:t>10/15/17</a:t>
+              <a:t>10/28/17</a:t>
             </a:fld>
             <a:endParaRPr lang="en-US"/>
           </a:p>
@@ -1021,7 +1022,7 @@
           <a:p>
             <a:fld id="{4C707D6F-0D04-EC44-A702-F7C7F0C5C2B0}" type="datetimeFigureOut">
               <a:rPr lang="en-US" smtClean="0"/>
-              <a:t>10/15/17</a:t>
+              <a:t>10/28/17</a:t>
             </a:fld>
             <a:endParaRPr lang="en-US"/>
           </a:p>
@@ -1186,7 +1187,7 @@
           <a:p>
             <a:fld id="{4C707D6F-0D04-EC44-A702-F7C7F0C5C2B0}" type="datetimeFigureOut">
               <a:rPr lang="en-US" smtClean="0"/>
-              <a:t>10/15/17</a:t>
+              <a:t>10/28/17</a:t>
             </a:fld>
             <a:endParaRPr lang="en-US"/>
           </a:p>
@@ -1427,7 +1428,7 @@
           <a:p>
             <a:fld id="{4C707D6F-0D04-EC44-A702-F7C7F0C5C2B0}" type="datetimeFigureOut">
               <a:rPr lang="en-US" smtClean="0"/>
-              <a:t>10/15/17</a:t>
+              <a:t>10/28/17</a:t>
             </a:fld>
             <a:endParaRPr lang="en-US"/>
           </a:p>
@@ -1654,7 +1655,7 @@
           <a:p>
             <a:fld id="{4C707D6F-0D04-EC44-A702-F7C7F0C5C2B0}" type="datetimeFigureOut">
               <a:rPr lang="en-US" smtClean="0"/>
-              <a:t>10/15/17</a:t>
+              <a:t>10/28/17</a:t>
             </a:fld>
             <a:endParaRPr lang="en-US"/>
           </a:p>
@@ -2016,7 +2017,7 @@
           <a:p>
             <a:fld id="{4C707D6F-0D04-EC44-A702-F7C7F0C5C2B0}" type="datetimeFigureOut">
               <a:rPr lang="en-US" smtClean="0"/>
-              <a:t>10/15/17</a:t>
+              <a:t>10/28/17</a:t>
             </a:fld>
             <a:endParaRPr lang="en-US"/>
           </a:p>
@@ -2129,7 +2130,7 @@
           <a:p>
             <a:fld id="{4C707D6F-0D04-EC44-A702-F7C7F0C5C2B0}" type="datetimeFigureOut">
               <a:rPr lang="en-US" smtClean="0"/>
-              <a:t>10/15/17</a:t>
+              <a:t>10/28/17</a:t>
             </a:fld>
             <a:endParaRPr lang="en-US"/>
           </a:p>
@@ -2219,7 +2220,7 @@
           <a:p>
             <a:fld id="{4C707D6F-0D04-EC44-A702-F7C7F0C5C2B0}" type="datetimeFigureOut">
               <a:rPr lang="en-US" smtClean="0"/>
-              <a:t>10/15/17</a:t>
+              <a:t>10/28/17</a:t>
             </a:fld>
             <a:endParaRPr lang="en-US"/>
           </a:p>
@@ -2491,7 +2492,7 @@
           <a:p>
             <a:fld id="{4C707D6F-0D04-EC44-A702-F7C7F0C5C2B0}" type="datetimeFigureOut">
               <a:rPr lang="en-US" smtClean="0"/>
-              <a:t>10/15/17</a:t>
+              <a:t>10/28/17</a:t>
             </a:fld>
             <a:endParaRPr lang="en-US"/>
           </a:p>
@@ -2743,7 +2744,7 @@
           <a:p>
             <a:fld id="{4C707D6F-0D04-EC44-A702-F7C7F0C5C2B0}" type="datetimeFigureOut">
               <a:rPr lang="en-US" smtClean="0"/>
-              <a:t>10/15/17</a:t>
+              <a:t>10/28/17</a:t>
             </a:fld>
             <a:endParaRPr lang="en-US"/>
           </a:p>
@@ -2951,7 +2952,7 @@
           <a:p>
             <a:fld id="{4C707D6F-0D04-EC44-A702-F7C7F0C5C2B0}" type="datetimeFigureOut">
               <a:rPr lang="en-US" smtClean="0"/>
-              <a:t>10/15/17</a:t>
+              <a:t>10/28/17</a:t>
             </a:fld>
             <a:endParaRPr lang="en-US"/>
           </a:p>
@@ -3358,29 +3359,28 @@
       </p:grpSpPr>
       <p:sp>
         <p:nvSpPr>
-          <p:cNvPr id="10" name="Rectangle 9"/>
+          <p:cNvPr id="34" name="Rectangle 33"/>
           <p:cNvSpPr/>
           <p:nvPr/>
         </p:nvSpPr>
         <p:spPr>
           <a:xfrm>
-            <a:off x="1639749" y="358816"/>
-            <a:ext cx="8935654" cy="2013994"/>
+            <a:off x="474133" y="395111"/>
+            <a:ext cx="10905067" cy="6197600"/>
           </a:xfrm>
           <a:prstGeom prst="rect">
             <a:avLst/>
           </a:prstGeom>
-          <a:noFill/>
         </p:spPr>
         <p:style>
           <a:lnRef idx="2">
-            <a:schemeClr val="accent6"/>
+            <a:schemeClr val="dk1"/>
           </a:lnRef>
           <a:fillRef idx="1">
             <a:schemeClr val="lt1"/>
           </a:fillRef>
           <a:effectRef idx="0">
-            <a:schemeClr val="accent6"/>
+            <a:schemeClr val="dk1"/>
           </a:effectRef>
           <a:fontRef idx="minor">
             <a:schemeClr val="dk1"/>
@@ -3395,440 +3395,942 @@
           </a:p>
         </p:txBody>
       </p:sp>
-      <p:sp>
-        <p:nvSpPr>
-          <p:cNvPr id="11" name="TextBox 10"/>
-          <p:cNvSpPr txBox="1"/>
-          <p:nvPr/>
-        </p:nvSpPr>
-        <p:spPr>
-          <a:xfrm>
-            <a:off x="1639749" y="358815"/>
-            <a:ext cx="1782499" cy="369332"/>
-          </a:xfrm>
-          <a:prstGeom prst="rect">
-            <a:avLst/>
-          </a:prstGeom>
-          <a:noFill/>
-        </p:spPr>
-        <p:style>
-          <a:lnRef idx="2">
-            <a:schemeClr val="accent6"/>
-          </a:lnRef>
-          <a:fillRef idx="1">
-            <a:schemeClr val="lt1"/>
-          </a:fillRef>
-          <a:effectRef idx="0">
-            <a:schemeClr val="accent6"/>
-          </a:effectRef>
-          <a:fontRef idx="minor">
-            <a:schemeClr val="dk1"/>
-          </a:fontRef>
-        </p:style>
-        <p:txBody>
-          <a:bodyPr wrap="square" rtlCol="0">
-            <a:spAutoFit/>
-          </a:bodyPr>
-          <a:lstStyle/>
-          <a:p>
-            <a:pPr algn="ctr"/>
-            <a:r>
-              <a:rPr lang="en-US"/>
-              <a:t>Sort Mechanism</a:t>
-            </a:r>
-            <a:endParaRPr lang="en-US" dirty="0"/>
-          </a:p>
-        </p:txBody>
-      </p:sp>
-      <p:sp>
-        <p:nvSpPr>
-          <p:cNvPr id="5" name="TextBox 4"/>
-          <p:cNvSpPr txBox="1"/>
-          <p:nvPr/>
-        </p:nvSpPr>
-        <p:spPr>
-          <a:xfrm>
-            <a:off x="2003473" y="851137"/>
-            <a:ext cx="1559786" cy="369332"/>
-          </a:xfrm>
-          <a:prstGeom prst="rect">
-            <a:avLst/>
-          </a:prstGeom>
-        </p:spPr>
-        <p:style>
-          <a:lnRef idx="1">
-            <a:schemeClr val="accent4"/>
-          </a:lnRef>
-          <a:fillRef idx="2">
-            <a:schemeClr val="accent4"/>
-          </a:fillRef>
-          <a:effectRef idx="1">
-            <a:schemeClr val="accent4"/>
-          </a:effectRef>
-          <a:fontRef idx="minor">
-            <a:schemeClr val="dk1"/>
-          </a:fontRef>
-        </p:style>
-        <p:txBody>
-          <a:bodyPr wrap="none" rtlCol="0">
-            <a:spAutoFit/>
-          </a:bodyPr>
-          <a:lstStyle/>
-          <a:p>
-            <a:pPr algn="ctr"/>
-            <a:r>
-              <a:rPr lang="en-US" dirty="0"/>
-              <a:t>:LogicManager</a:t>
-            </a:r>
-          </a:p>
-        </p:txBody>
-      </p:sp>
-      <p:sp>
-        <p:nvSpPr>
-          <p:cNvPr id="6" name="TextBox 5"/>
-          <p:cNvSpPr txBox="1"/>
-          <p:nvPr/>
-        </p:nvSpPr>
-        <p:spPr>
-          <a:xfrm>
-            <a:off x="1755971" y="1712789"/>
-            <a:ext cx="2054793" cy="369332"/>
-          </a:xfrm>
-          <a:prstGeom prst="rect">
-            <a:avLst/>
-          </a:prstGeom>
-        </p:spPr>
-        <p:style>
-          <a:lnRef idx="1">
-            <a:schemeClr val="accent5"/>
-          </a:lnRef>
-          <a:fillRef idx="2">
-            <a:schemeClr val="accent5"/>
-          </a:fillRef>
-          <a:effectRef idx="1">
-            <a:schemeClr val="accent5"/>
-          </a:effectRef>
-          <a:fontRef idx="minor">
-            <a:schemeClr val="dk1"/>
-          </a:fontRef>
-        </p:style>
-        <p:txBody>
-          <a:bodyPr wrap="none" rtlCol="0">
-            <a:spAutoFit/>
-          </a:bodyPr>
-          <a:lstStyle/>
-          <a:p>
-            <a:r>
-              <a:rPr lang="en-US" dirty="0"/>
-              <a:t>:AddressBookParser</a:t>
-            </a:r>
-          </a:p>
-        </p:txBody>
-      </p:sp>
+      <p:graphicFrame>
+        <p:nvGraphicFramePr>
+          <p:cNvPr id="16" name="Table 15"/>
+          <p:cNvGraphicFramePr>
+            <a:graphicFrameLocks noGrp="1"/>
+          </p:cNvGraphicFramePr>
+          <p:nvPr>
+            <p:extLst>
+              <p:ext uri="{D42A27DB-BD31-4B8C-83A1-F6EECF244321}">
+                <p14:modId xmlns:p14="http://schemas.microsoft.com/office/powerpoint/2010/main" val="1647955541"/>
+              </p:ext>
+            </p:extLst>
+          </p:nvPr>
+        </p:nvGraphicFramePr>
+        <p:xfrm>
+          <a:off x="4275945" y="1797630"/>
+          <a:ext cx="1668652" cy="1651000"/>
+        </p:xfrm>
+        <a:graphic>
+          <a:graphicData uri="http://schemas.openxmlformats.org/drawingml/2006/table">
+            <a:tbl>
+              <a:tblPr firstRow="1" bandRow="1">
+                <a:tableStyleId>{5C22544A-7EE6-4342-B048-85BDC9FD1C3A}</a:tableStyleId>
+              </a:tblPr>
+              <a:tblGrid>
+                <a:gridCol w="1668652"/>
+              </a:tblGrid>
+              <a:tr h="370840">
+                <a:tc>
+                  <a:txBody>
+                    <a:bodyPr/>
+                    <a:lstStyle/>
+                    <a:p>
+                      <a:pPr algn="just"/>
+                      <a:r>
+                        <a:rPr lang="en-US" dirty="0" err="1" smtClean="0"/>
+                        <a:t>SortCommand</a:t>
+                      </a:r>
+                      <a:endParaRPr lang="en-US" dirty="0"/>
+                    </a:p>
+                  </a:txBody>
+                  <a:tcPr/>
+                </a:tc>
+              </a:tr>
+              <a:tr h="370840">
+                <a:tc>
+                  <a:txBody>
+                    <a:bodyPr/>
+                    <a:lstStyle/>
+                    <a:p>
+                      <a:pPr marL="0" indent="0" algn="just">
+                        <a:buFontTx/>
+                        <a:buNone/>
+                      </a:pPr>
+                      <a:r>
+                        <a:rPr lang="en-US" dirty="0" smtClean="0"/>
+                        <a:t>- field:</a:t>
+                      </a:r>
+                      <a:r>
+                        <a:rPr lang="en-US" baseline="0" dirty="0" smtClean="0"/>
+                        <a:t> String</a:t>
+                      </a:r>
+                      <a:endParaRPr lang="en-US" dirty="0" smtClean="0"/>
+                    </a:p>
+                    <a:p>
+                      <a:pPr marL="0" indent="0" algn="just">
+                        <a:buFontTx/>
+                        <a:buNone/>
+                      </a:pPr>
+                      <a:r>
+                        <a:rPr lang="en-US" dirty="0" smtClean="0"/>
+                        <a:t>- order: String</a:t>
+                      </a:r>
+                      <a:endParaRPr lang="en-US" dirty="0"/>
+                    </a:p>
+                  </a:txBody>
+                  <a:tcPr/>
+                </a:tc>
+              </a:tr>
+              <a:tr h="370840">
+                <a:tc>
+                  <a:txBody>
+                    <a:bodyPr/>
+                    <a:lstStyle/>
+                    <a:p>
+                      <a:pPr algn="just"/>
+                      <a:r>
+                        <a:rPr lang="en-US" dirty="0" smtClean="0"/>
+                        <a:t>+ </a:t>
+                      </a:r>
+                      <a:r>
+                        <a:rPr lang="en-US" dirty="0" err="1" smtClean="0"/>
+                        <a:t>getField</a:t>
+                      </a:r>
+                      <a:r>
+                        <a:rPr lang="en-US" dirty="0" smtClean="0"/>
+                        <a:t>()</a:t>
+                      </a:r>
+                    </a:p>
+                    <a:p>
+                      <a:pPr algn="just"/>
+                      <a:r>
+                        <a:rPr lang="en-US" dirty="0" smtClean="0"/>
+                        <a:t>+ </a:t>
+                      </a:r>
+                      <a:r>
+                        <a:rPr lang="en-US" dirty="0" err="1" smtClean="0"/>
+                        <a:t>getOrder</a:t>
+                      </a:r>
+                      <a:r>
+                        <a:rPr lang="en-US" dirty="0" smtClean="0"/>
+                        <a:t>()</a:t>
+                      </a:r>
+                      <a:endParaRPr lang="en-US" dirty="0"/>
+                    </a:p>
+                  </a:txBody>
+                  <a:tcPr/>
+                </a:tc>
+              </a:tr>
+            </a:tbl>
+          </a:graphicData>
+        </a:graphic>
+      </p:graphicFrame>
+      <p:graphicFrame>
+        <p:nvGraphicFramePr>
+          <p:cNvPr id="18" name="Table 17"/>
+          <p:cNvGraphicFramePr>
+            <a:graphicFrameLocks noGrp="1"/>
+          </p:cNvGraphicFramePr>
+          <p:nvPr>
+            <p:extLst>
+              <p:ext uri="{D42A27DB-BD31-4B8C-83A1-F6EECF244321}">
+                <p14:modId xmlns:p14="http://schemas.microsoft.com/office/powerpoint/2010/main" val="1092182228"/>
+              </p:ext>
+            </p:extLst>
+          </p:nvPr>
+        </p:nvGraphicFramePr>
+        <p:xfrm>
+          <a:off x="1312031" y="4175127"/>
+          <a:ext cx="2284070" cy="741680"/>
+        </p:xfrm>
+        <a:graphic>
+          <a:graphicData uri="http://schemas.openxmlformats.org/drawingml/2006/table">
+            <a:tbl>
+              <a:tblPr firstRow="1" bandRow="1">
+                <a:tableStyleId>{5C22544A-7EE6-4342-B048-85BDC9FD1C3A}</a:tableStyleId>
+              </a:tblPr>
+              <a:tblGrid>
+                <a:gridCol w="2284070"/>
+              </a:tblGrid>
+              <a:tr h="370840">
+                <a:tc>
+                  <a:txBody>
+                    <a:bodyPr/>
+                    <a:lstStyle/>
+                    <a:p>
+                      <a:pPr algn="just"/>
+                      <a:r>
+                        <a:rPr lang="en-US" sz="1600" dirty="0" err="1" smtClean="0"/>
+                        <a:t>SortCommandParser</a:t>
+                      </a:r>
+                      <a:endParaRPr lang="en-US" sz="1600" dirty="0"/>
+                    </a:p>
+                  </a:txBody>
+                  <a:tcPr/>
+                </a:tc>
+              </a:tr>
+              <a:tr h="370840">
+                <a:tc>
+                  <a:txBody>
+                    <a:bodyPr/>
+                    <a:lstStyle/>
+                    <a:p>
+                      <a:pPr algn="just"/>
+                      <a:r>
+                        <a:rPr lang="en-US" dirty="0" smtClean="0"/>
+                        <a:t>+ parse(String</a:t>
+                      </a:r>
+                      <a:r>
+                        <a:rPr lang="en-US" baseline="0" dirty="0" smtClean="0"/>
+                        <a:t> </a:t>
+                      </a:r>
+                      <a:r>
+                        <a:rPr lang="en-US" baseline="0" dirty="0" err="1" smtClean="0"/>
+                        <a:t>args</a:t>
+                      </a:r>
+                      <a:r>
+                        <a:rPr lang="en-US" baseline="0" dirty="0" smtClean="0"/>
+                        <a:t>)</a:t>
+                      </a:r>
+                      <a:endParaRPr lang="en-US" dirty="0"/>
+                    </a:p>
+                  </a:txBody>
+                  <a:tcPr/>
+                </a:tc>
+              </a:tr>
+            </a:tbl>
+          </a:graphicData>
+        </a:graphic>
+      </p:graphicFrame>
+      <p:graphicFrame>
+        <p:nvGraphicFramePr>
+          <p:cNvPr id="19" name="Table 18"/>
+          <p:cNvGraphicFramePr>
+            <a:graphicFrameLocks noGrp="1"/>
+          </p:cNvGraphicFramePr>
+          <p:nvPr>
+            <p:extLst>
+              <p:ext uri="{D42A27DB-BD31-4B8C-83A1-F6EECF244321}">
+                <p14:modId xmlns:p14="http://schemas.microsoft.com/office/powerpoint/2010/main" val="1763975087"/>
+              </p:ext>
+            </p:extLst>
+          </p:nvPr>
+        </p:nvGraphicFramePr>
+        <p:xfrm>
+          <a:off x="6641965" y="1137541"/>
+          <a:ext cx="4462204" cy="2733154"/>
+        </p:xfrm>
+        <a:graphic>
+          <a:graphicData uri="http://schemas.openxmlformats.org/drawingml/2006/table">
+            <a:tbl>
+              <a:tblPr firstRow="1" bandRow="1">
+                <a:tableStyleId>{5C22544A-7EE6-4342-B048-85BDC9FD1C3A}</a:tableStyleId>
+              </a:tblPr>
+              <a:tblGrid>
+                <a:gridCol w="4462204"/>
+              </a:tblGrid>
+              <a:tr h="355714">
+                <a:tc>
+                  <a:txBody>
+                    <a:bodyPr/>
+                    <a:lstStyle/>
+                    <a:p>
+                      <a:pPr algn="just"/>
+                      <a:r>
+                        <a:rPr lang="en-US" sz="1600" dirty="0" err="1" smtClean="0"/>
+                        <a:t>AddressBook</a:t>
+                      </a:r>
+                      <a:endParaRPr lang="en-US" sz="1600" dirty="0"/>
+                    </a:p>
+                  </a:txBody>
+                  <a:tcPr/>
+                </a:tc>
+              </a:tr>
+              <a:tr h="370840">
+                <a:tc>
+                  <a:txBody>
+                    <a:bodyPr/>
+                    <a:lstStyle/>
+                    <a:p>
+                      <a:pPr marL="0" indent="0" algn="just">
+                        <a:buFontTx/>
+                        <a:buNone/>
+                      </a:pPr>
+                      <a:r>
+                        <a:rPr lang="en-US" sz="1600" dirty="0" smtClean="0"/>
+                        <a:t>- persons: </a:t>
+                      </a:r>
+                      <a:r>
+                        <a:rPr lang="en-US" sz="1600" dirty="0" err="1" smtClean="0"/>
+                        <a:t>UniquePersonList</a:t>
+                      </a:r>
+                      <a:endParaRPr lang="en-US" sz="1600" dirty="0" smtClean="0"/>
+                    </a:p>
+                    <a:p>
+                      <a:pPr marL="0" indent="0" algn="just">
+                        <a:buFontTx/>
+                        <a:buNone/>
+                      </a:pPr>
+                      <a:r>
+                        <a:rPr lang="en-US" sz="1600" dirty="0" smtClean="0"/>
+                        <a:t>- tags:</a:t>
+                      </a:r>
+                      <a:r>
+                        <a:rPr lang="en-US" sz="1600" baseline="0" dirty="0" smtClean="0"/>
+                        <a:t> </a:t>
+                      </a:r>
+                      <a:r>
+                        <a:rPr lang="en-US" sz="1600" baseline="0" dirty="0" err="1" smtClean="0"/>
+                        <a:t>UniqueTagList</a:t>
+                      </a:r>
+                      <a:endParaRPr lang="en-US" sz="1600" baseline="0" dirty="0" smtClean="0"/>
+                    </a:p>
+                    <a:p>
+                      <a:pPr marL="0" indent="0" algn="just">
+                        <a:buFontTx/>
+                        <a:buNone/>
+                      </a:pPr>
+                      <a:r>
+                        <a:rPr lang="en-US" sz="1600" dirty="0" smtClean="0"/>
+                        <a:t>- tasks:</a:t>
+                      </a:r>
+                      <a:r>
+                        <a:rPr lang="en-US" sz="1600" baseline="0" dirty="0" smtClean="0"/>
+                        <a:t> </a:t>
+                      </a:r>
+                      <a:r>
+                        <a:rPr lang="en-US" sz="1600" baseline="0" dirty="0" err="1" smtClean="0"/>
+                        <a:t>UniqueTasksList</a:t>
+                      </a:r>
+                      <a:endParaRPr lang="en-US" sz="1600" dirty="0"/>
+                    </a:p>
+                  </a:txBody>
+                  <a:tcPr/>
+                </a:tc>
+              </a:tr>
+              <a:tr h="370840">
+                <a:tc>
+                  <a:txBody>
+                    <a:bodyPr/>
+                    <a:lstStyle/>
+                    <a:p>
+                      <a:pPr algn="just"/>
+                      <a:r>
+                        <a:rPr lang="en-US" sz="1600" dirty="0" smtClean="0"/>
+                        <a:t>+ parse(String</a:t>
+                      </a:r>
+                      <a:r>
+                        <a:rPr lang="en-US" sz="1600" baseline="0" dirty="0" smtClean="0"/>
+                        <a:t> </a:t>
+                      </a:r>
+                      <a:r>
+                        <a:rPr lang="en-US" sz="1600" baseline="0" dirty="0" err="1" smtClean="0"/>
+                        <a:t>args</a:t>
+                      </a:r>
+                      <a:r>
+                        <a:rPr lang="en-US" sz="1600" baseline="0" dirty="0" smtClean="0"/>
+                        <a:t>)</a:t>
+                      </a:r>
+                    </a:p>
+                    <a:p>
+                      <a:pPr algn="just"/>
+                      <a:r>
+                        <a:rPr lang="en-US" sz="1600" baseline="0" dirty="0" smtClean="0"/>
+                        <a:t>+ </a:t>
+                      </a:r>
+                      <a:r>
+                        <a:rPr lang="en-US" sz="1600" baseline="0" dirty="0" err="1" smtClean="0"/>
+                        <a:t>setPersons</a:t>
+                      </a:r>
+                      <a:r>
+                        <a:rPr lang="en-US" sz="1600" baseline="0" dirty="0" smtClean="0"/>
+                        <a:t>(List&lt;</a:t>
+                      </a:r>
+                      <a:r>
+                        <a:rPr lang="en-US" sz="1600" baseline="0" dirty="0" err="1" smtClean="0"/>
+                        <a:t>ReadOnlyPerson</a:t>
+                      </a:r>
+                      <a:r>
+                        <a:rPr lang="en-US" sz="1600" baseline="0" dirty="0" smtClean="0"/>
+                        <a:t>&gt; persons)</a:t>
+                      </a:r>
+                    </a:p>
+                    <a:p>
+                      <a:pPr algn="just"/>
+                      <a:r>
+                        <a:rPr lang="en-US" sz="1600" baseline="0" dirty="0" smtClean="0"/>
+                        <a:t>+ </a:t>
+                      </a:r>
+                      <a:r>
+                        <a:rPr lang="en-US" sz="1600" kern="1200" dirty="0" err="1" smtClean="0">
+                          <a:solidFill>
+                            <a:schemeClr val="dk1"/>
+                          </a:solidFill>
+                          <a:effectLst/>
+                          <a:latin typeface="+mn-lt"/>
+                          <a:ea typeface="+mn-ea"/>
+                          <a:cs typeface="+mn-cs"/>
+                        </a:rPr>
+                        <a:t>setTags</a:t>
+                      </a:r>
+                      <a:r>
+                        <a:rPr lang="en-US" sz="1600" dirty="0" smtClean="0"/>
+                        <a:t>(Set&lt;Tag&gt; tags)</a:t>
+                      </a:r>
+                    </a:p>
+                    <a:p>
+                      <a:pPr algn="just"/>
+                      <a:r>
+                        <a:rPr lang="en-US" sz="1600" dirty="0" smtClean="0"/>
+                        <a:t>+ </a:t>
+                      </a:r>
+                      <a:r>
+                        <a:rPr lang="en-US" sz="1600" kern="1200" dirty="0" err="1" smtClean="0">
+                          <a:solidFill>
+                            <a:schemeClr val="dk1"/>
+                          </a:solidFill>
+                          <a:effectLst/>
+                          <a:latin typeface="+mn-lt"/>
+                          <a:ea typeface="+mn-ea"/>
+                          <a:cs typeface="+mn-cs"/>
+                        </a:rPr>
+                        <a:t>resetData</a:t>
+                      </a:r>
+                      <a:r>
+                        <a:rPr lang="en-US" sz="1600" dirty="0" smtClean="0"/>
+                        <a:t>(</a:t>
+                      </a:r>
+                      <a:r>
+                        <a:rPr lang="en-US" sz="1600" dirty="0" err="1" smtClean="0"/>
+                        <a:t>ReadOnlyAddressBook</a:t>
+                      </a:r>
+                      <a:r>
+                        <a:rPr lang="en-US" sz="1600" dirty="0" smtClean="0"/>
+                        <a:t> </a:t>
+                      </a:r>
+                      <a:r>
+                        <a:rPr lang="en-US" sz="1600" dirty="0" err="1" smtClean="0"/>
+                        <a:t>newData</a:t>
+                      </a:r>
+                      <a:r>
+                        <a:rPr lang="en-US" sz="1600" dirty="0" smtClean="0"/>
+                        <a:t>)</a:t>
+                      </a:r>
+                    </a:p>
+                    <a:p>
+                      <a:pPr algn="just"/>
+                      <a:r>
+                        <a:rPr lang="en-US" sz="1600" dirty="0" smtClean="0"/>
+                        <a:t>+ </a:t>
+                      </a:r>
+                      <a:r>
+                        <a:rPr lang="en-US" sz="1600" kern="1200" dirty="0" err="1" smtClean="0">
+                          <a:solidFill>
+                            <a:schemeClr val="dk1"/>
+                          </a:solidFill>
+                          <a:effectLst/>
+                          <a:latin typeface="+mn-lt"/>
+                          <a:ea typeface="+mn-ea"/>
+                          <a:cs typeface="+mn-cs"/>
+                        </a:rPr>
+                        <a:t>addPerson</a:t>
+                      </a:r>
+                      <a:r>
+                        <a:rPr lang="en-US" sz="1600" dirty="0" smtClean="0"/>
+                        <a:t>(</a:t>
+                      </a:r>
+                      <a:r>
+                        <a:rPr lang="en-US" sz="1600" dirty="0" err="1" smtClean="0"/>
+                        <a:t>ReadOnlyPerson</a:t>
+                      </a:r>
+                      <a:r>
+                        <a:rPr lang="en-US" sz="1600" dirty="0" smtClean="0"/>
+                        <a:t> p)</a:t>
+                      </a:r>
+                    </a:p>
+                    <a:p>
+                      <a:pPr algn="just"/>
+                      <a:r>
+                        <a:rPr lang="mr-IN" sz="1600" dirty="0" smtClean="0"/>
+                        <a:t>…</a:t>
+                      </a:r>
+                      <a:endParaRPr lang="en-US" sz="1600" dirty="0"/>
+                    </a:p>
+                  </a:txBody>
+                  <a:tcPr/>
+                </a:tc>
+              </a:tr>
+            </a:tbl>
+          </a:graphicData>
+        </a:graphic>
+      </p:graphicFrame>
+      <p:graphicFrame>
+        <p:nvGraphicFramePr>
+          <p:cNvPr id="20" name="Table 19"/>
+          <p:cNvGraphicFramePr>
+            <a:graphicFrameLocks noGrp="1"/>
+          </p:cNvGraphicFramePr>
+          <p:nvPr>
+            <p:extLst>
+              <p:ext uri="{D42A27DB-BD31-4B8C-83A1-F6EECF244321}">
+                <p14:modId xmlns:p14="http://schemas.microsoft.com/office/powerpoint/2010/main" val="1117540374"/>
+              </p:ext>
+            </p:extLst>
+          </p:nvPr>
+        </p:nvGraphicFramePr>
+        <p:xfrm>
+          <a:off x="4275945" y="4175127"/>
+          <a:ext cx="6299200" cy="2260600"/>
+        </p:xfrm>
+        <a:graphic>
+          <a:graphicData uri="http://schemas.openxmlformats.org/drawingml/2006/table">
+            <a:tbl>
+              <a:tblPr firstRow="1" bandRow="1">
+                <a:tableStyleId>{5C22544A-7EE6-4342-B048-85BDC9FD1C3A}</a:tableStyleId>
+              </a:tblPr>
+              <a:tblGrid>
+                <a:gridCol w="6299200"/>
+              </a:tblGrid>
+              <a:tr h="370840">
+                <a:tc>
+                  <a:txBody>
+                    <a:bodyPr/>
+                    <a:lstStyle/>
+                    <a:p>
+                      <a:pPr algn="just"/>
+                      <a:r>
+                        <a:rPr lang="en-US" sz="1600" dirty="0" err="1" smtClean="0"/>
+                        <a:t>UniquePersonList</a:t>
+                      </a:r>
+                      <a:endParaRPr lang="en-US" sz="1600" dirty="0"/>
+                    </a:p>
+                  </a:txBody>
+                  <a:tcPr/>
+                </a:tc>
+              </a:tr>
+              <a:tr h="370840">
+                <a:tc>
+                  <a:txBody>
+                    <a:bodyPr/>
+                    <a:lstStyle/>
+                    <a:p>
+                      <a:pPr marL="0" indent="0" algn="just">
+                        <a:buFontTx/>
+                        <a:buNone/>
+                      </a:pPr>
+                      <a:r>
+                        <a:rPr lang="en-US" sz="1600" dirty="0" smtClean="0"/>
+                        <a:t>- </a:t>
+                      </a:r>
+                      <a:r>
+                        <a:rPr lang="en-US" sz="1600" dirty="0" err="1" smtClean="0"/>
+                        <a:t>internalList</a:t>
+                      </a:r>
+                      <a:r>
+                        <a:rPr lang="en-US" sz="1600" baseline="0" dirty="0" smtClean="0"/>
+                        <a:t>: </a:t>
+                      </a:r>
+                      <a:r>
+                        <a:rPr lang="en-US" sz="1600" baseline="0" dirty="0" err="1" smtClean="0"/>
+                        <a:t>ObservableList</a:t>
+                      </a:r>
+                      <a:r>
+                        <a:rPr lang="en-US" sz="1600" baseline="0" dirty="0" smtClean="0"/>
+                        <a:t>&lt;Person&gt;</a:t>
+                      </a:r>
+                      <a:endParaRPr lang="en-US" sz="1600" dirty="0" smtClean="0"/>
+                    </a:p>
+                    <a:p>
+                      <a:pPr marL="0" indent="0" algn="just">
+                        <a:buFontTx/>
+                        <a:buNone/>
+                      </a:pPr>
+                      <a:r>
+                        <a:rPr lang="en-US" sz="1600" dirty="0" smtClean="0"/>
+                        <a:t>- </a:t>
+                      </a:r>
+                      <a:r>
+                        <a:rPr lang="en-US" sz="1600" dirty="0" err="1" smtClean="0"/>
+                        <a:t>mappedList</a:t>
+                      </a:r>
+                      <a:r>
+                        <a:rPr lang="en-US" sz="1600" dirty="0" smtClean="0"/>
+                        <a:t>: </a:t>
+                      </a:r>
+                      <a:r>
+                        <a:rPr lang="en-US" sz="1600" dirty="0" err="1" smtClean="0"/>
+                        <a:t>ObservableList</a:t>
+                      </a:r>
+                      <a:r>
+                        <a:rPr lang="en-US" sz="1600" dirty="0" smtClean="0"/>
+                        <a:t>&lt;</a:t>
+                      </a:r>
+                      <a:r>
+                        <a:rPr lang="en-US" sz="1600" dirty="0" err="1" smtClean="0"/>
+                        <a:t>ReadOnlyPerson</a:t>
+                      </a:r>
+                      <a:r>
+                        <a:rPr lang="en-US" sz="1600" dirty="0" smtClean="0"/>
+                        <a:t>&gt;</a:t>
+                      </a:r>
+                      <a:endParaRPr lang="en-US" sz="1600" baseline="0" dirty="0" smtClean="0"/>
+                    </a:p>
+                    <a:p>
+                      <a:pPr marL="0" indent="0" algn="just">
+                        <a:buFontTx/>
+                        <a:buNone/>
+                      </a:pPr>
+                      <a:r>
+                        <a:rPr lang="en-US" sz="1600" dirty="0" smtClean="0"/>
+                        <a:t>- tasks:</a:t>
+                      </a:r>
+                      <a:r>
+                        <a:rPr lang="en-US" sz="1600" baseline="0" dirty="0" smtClean="0"/>
+                        <a:t> </a:t>
+                      </a:r>
+                      <a:r>
+                        <a:rPr lang="en-US" sz="1600" baseline="0" dirty="0" err="1" smtClean="0"/>
+                        <a:t>UniqueTasksList</a:t>
+                      </a:r>
+                      <a:endParaRPr lang="en-US" sz="1600" dirty="0"/>
+                    </a:p>
+                  </a:txBody>
+                  <a:tcPr/>
+                </a:tc>
+              </a:tr>
+              <a:tr h="370840">
+                <a:tc>
+                  <a:txBody>
+                    <a:bodyPr/>
+                    <a:lstStyle/>
+                    <a:p>
+                      <a:pPr algn="just"/>
+                      <a:r>
+                        <a:rPr lang="en-US" sz="1600" dirty="0" smtClean="0"/>
+                        <a:t>+ </a:t>
+                      </a:r>
+                      <a:r>
+                        <a:rPr lang="en-US" sz="1600" kern="1200" dirty="0" smtClean="0">
+                          <a:solidFill>
+                            <a:schemeClr val="dk1"/>
+                          </a:solidFill>
+                          <a:effectLst/>
+                          <a:latin typeface="+mn-lt"/>
+                          <a:ea typeface="+mn-ea"/>
+                          <a:cs typeface="+mn-cs"/>
+                        </a:rPr>
+                        <a:t>contains</a:t>
+                      </a:r>
+                      <a:r>
+                        <a:rPr lang="en-US" sz="1600" dirty="0" smtClean="0"/>
+                        <a:t>(</a:t>
+                      </a:r>
+                      <a:r>
+                        <a:rPr lang="en-US" sz="1600" dirty="0" err="1" smtClean="0"/>
+                        <a:t>ReadOnlyPerson</a:t>
+                      </a:r>
+                      <a:r>
+                        <a:rPr lang="en-US" sz="1600" dirty="0" smtClean="0"/>
+                        <a:t> </a:t>
+                      </a:r>
+                      <a:r>
+                        <a:rPr lang="en-US" sz="1600" dirty="0" err="1" smtClean="0"/>
+                        <a:t>toCheck</a:t>
+                      </a:r>
+                      <a:r>
+                        <a:rPr lang="en-US" sz="1600" dirty="0" smtClean="0"/>
+                        <a:t>)</a:t>
+                      </a:r>
+                    </a:p>
+                    <a:p>
+                      <a:pPr algn="just"/>
+                      <a:r>
+                        <a:rPr lang="en-US" sz="1600" baseline="0" dirty="0" smtClean="0"/>
+                        <a:t>+ </a:t>
+                      </a:r>
+                      <a:r>
+                        <a:rPr lang="en-US" sz="1600" kern="1200" dirty="0" smtClean="0">
+                          <a:solidFill>
+                            <a:schemeClr val="dk1"/>
+                          </a:solidFill>
+                          <a:effectLst/>
+                          <a:latin typeface="+mn-lt"/>
+                          <a:ea typeface="+mn-ea"/>
+                          <a:cs typeface="+mn-cs"/>
+                        </a:rPr>
+                        <a:t>add</a:t>
+                      </a:r>
+                      <a:r>
+                        <a:rPr lang="en-US" sz="1600" dirty="0" smtClean="0"/>
+                        <a:t>(</a:t>
+                      </a:r>
+                      <a:r>
+                        <a:rPr lang="en-US" sz="1600" dirty="0" err="1" smtClean="0"/>
+                        <a:t>ReadOnlyPerson</a:t>
+                      </a:r>
+                      <a:r>
+                        <a:rPr lang="en-US" sz="1600" dirty="0" smtClean="0"/>
+                        <a:t> </a:t>
+                      </a:r>
+                      <a:r>
+                        <a:rPr lang="en-US" sz="1600" dirty="0" err="1" smtClean="0"/>
+                        <a:t>toAdd</a:t>
+                      </a:r>
+                      <a:r>
+                        <a:rPr lang="en-US" sz="1600" dirty="0" smtClean="0"/>
+                        <a:t>)</a:t>
+                      </a:r>
+                      <a:endParaRPr lang="en-US" sz="1600" baseline="0" dirty="0" smtClean="0"/>
+                    </a:p>
+                    <a:p>
+                      <a:pPr algn="just"/>
+                      <a:r>
+                        <a:rPr lang="en-US" sz="1600" baseline="0" dirty="0" smtClean="0"/>
+                        <a:t>+ </a:t>
+                      </a:r>
+                      <a:r>
+                        <a:rPr lang="en-US" sz="1600" kern="1200" dirty="0" err="1" smtClean="0">
+                          <a:solidFill>
+                            <a:schemeClr val="dk1"/>
+                          </a:solidFill>
+                          <a:effectLst/>
+                          <a:latin typeface="+mn-lt"/>
+                          <a:ea typeface="+mn-ea"/>
+                          <a:cs typeface="+mn-cs"/>
+                        </a:rPr>
+                        <a:t>setPerson</a:t>
+                      </a:r>
+                      <a:r>
+                        <a:rPr lang="en-US" sz="1600" dirty="0" smtClean="0"/>
+                        <a:t>(</a:t>
+                      </a:r>
+                      <a:r>
+                        <a:rPr lang="en-US" sz="1600" dirty="0" err="1" smtClean="0"/>
+                        <a:t>ReadOnlyPerson</a:t>
+                      </a:r>
+                      <a:r>
+                        <a:rPr lang="en-US" sz="1600" dirty="0" smtClean="0"/>
+                        <a:t> target</a:t>
+                      </a:r>
+                      <a:r>
+                        <a:rPr lang="en-US" sz="1600" kern="1200" dirty="0" smtClean="0">
+                          <a:solidFill>
+                            <a:schemeClr val="dk1"/>
+                          </a:solidFill>
+                          <a:effectLst/>
+                          <a:latin typeface="+mn-lt"/>
+                          <a:ea typeface="+mn-ea"/>
+                          <a:cs typeface="+mn-cs"/>
+                        </a:rPr>
+                        <a:t>, </a:t>
+                      </a:r>
+                      <a:r>
+                        <a:rPr lang="en-US" sz="1600" dirty="0" err="1" smtClean="0"/>
+                        <a:t>ReadOnlyPerson</a:t>
+                      </a:r>
+                      <a:r>
+                        <a:rPr lang="en-US" sz="1600" dirty="0" smtClean="0"/>
+                        <a:t> </a:t>
+                      </a:r>
+                      <a:r>
+                        <a:rPr lang="en-US" sz="1600" dirty="0" err="1" smtClean="0"/>
+                        <a:t>editedPerson</a:t>
+                      </a:r>
+                      <a:r>
+                        <a:rPr lang="en-US" sz="1600" dirty="0" smtClean="0"/>
+                        <a:t>)</a:t>
+                      </a:r>
+                    </a:p>
+                    <a:p>
+                      <a:pPr algn="just"/>
+                      <a:r>
+                        <a:rPr lang="mr-IN" sz="1600" dirty="0" smtClean="0"/>
+                        <a:t>…</a:t>
+                      </a:r>
+                      <a:endParaRPr lang="en-US" sz="1600" dirty="0"/>
+                    </a:p>
+                  </a:txBody>
+                  <a:tcPr/>
+                </a:tc>
+              </a:tr>
+            </a:tbl>
+          </a:graphicData>
+        </a:graphic>
+      </p:graphicFrame>
+      <p:graphicFrame>
+        <p:nvGraphicFramePr>
+          <p:cNvPr id="22" name="Table 21"/>
+          <p:cNvGraphicFramePr>
+            <a:graphicFrameLocks noGrp="1"/>
+          </p:cNvGraphicFramePr>
+          <p:nvPr>
+            <p:extLst>
+              <p:ext uri="{D42A27DB-BD31-4B8C-83A1-F6EECF244321}">
+                <p14:modId xmlns:p14="http://schemas.microsoft.com/office/powerpoint/2010/main" val="609089156"/>
+              </p:ext>
+            </p:extLst>
+          </p:nvPr>
+        </p:nvGraphicFramePr>
+        <p:xfrm>
+          <a:off x="1312031" y="2623130"/>
+          <a:ext cx="2284070" cy="1112520"/>
+        </p:xfrm>
+        <a:graphic>
+          <a:graphicData uri="http://schemas.openxmlformats.org/drawingml/2006/table">
+            <a:tbl>
+              <a:tblPr firstRow="1" bandRow="1">
+                <a:tableStyleId>{5C22544A-7EE6-4342-B048-85BDC9FD1C3A}</a:tableStyleId>
+              </a:tblPr>
+              <a:tblGrid>
+                <a:gridCol w="2284070"/>
+              </a:tblGrid>
+              <a:tr h="370840">
+                <a:tc>
+                  <a:txBody>
+                    <a:bodyPr/>
+                    <a:lstStyle/>
+                    <a:p>
+                      <a:pPr algn="just"/>
+                      <a:r>
+                        <a:rPr lang="en-US" sz="1600" dirty="0" err="1" smtClean="0"/>
+                        <a:t>AddressBookParser</a:t>
+                      </a:r>
+                      <a:endParaRPr lang="en-US" sz="1600" dirty="0"/>
+                    </a:p>
+                  </a:txBody>
+                  <a:tcPr/>
+                </a:tc>
+              </a:tr>
+              <a:tr h="370840">
+                <a:tc>
+                  <a:txBody>
+                    <a:bodyPr/>
+                    <a:lstStyle/>
+                    <a:p>
+                      <a:pPr algn="ctr"/>
+                      <a:r>
+                        <a:rPr lang="mr-IN" dirty="0" smtClean="0"/>
+                        <a:t>…</a:t>
+                      </a:r>
+                      <a:endParaRPr lang="en-US" dirty="0"/>
+                    </a:p>
+                  </a:txBody>
+                  <a:tcPr/>
+                </a:tc>
+              </a:tr>
+              <a:tr h="370840">
+                <a:tc>
+                  <a:txBody>
+                    <a:bodyPr/>
+                    <a:lstStyle/>
+                    <a:p>
+                      <a:pPr algn="ctr"/>
+                      <a:r>
+                        <a:rPr lang="mr-IN" dirty="0" smtClean="0"/>
+                        <a:t>…</a:t>
+                      </a:r>
+                      <a:endParaRPr lang="en-US" dirty="0"/>
+                    </a:p>
+                  </a:txBody>
+                  <a:tcPr/>
+                </a:tc>
+              </a:tr>
+            </a:tbl>
+          </a:graphicData>
+        </a:graphic>
+      </p:graphicFrame>
+      <p:graphicFrame>
+        <p:nvGraphicFramePr>
+          <p:cNvPr id="25" name="Table 24"/>
+          <p:cNvGraphicFramePr>
+            <a:graphicFrameLocks noGrp="1"/>
+          </p:cNvGraphicFramePr>
+          <p:nvPr>
+            <p:extLst>
+              <p:ext uri="{D42A27DB-BD31-4B8C-83A1-F6EECF244321}">
+                <p14:modId xmlns:p14="http://schemas.microsoft.com/office/powerpoint/2010/main" val="2054383290"/>
+              </p:ext>
+            </p:extLst>
+          </p:nvPr>
+        </p:nvGraphicFramePr>
+        <p:xfrm>
+          <a:off x="1329554" y="1137541"/>
+          <a:ext cx="2284070" cy="1112520"/>
+        </p:xfrm>
+        <a:graphic>
+          <a:graphicData uri="http://schemas.openxmlformats.org/drawingml/2006/table">
+            <a:tbl>
+              <a:tblPr firstRow="1" bandRow="1">
+                <a:tableStyleId>{5C22544A-7EE6-4342-B048-85BDC9FD1C3A}</a:tableStyleId>
+              </a:tblPr>
+              <a:tblGrid>
+                <a:gridCol w="2284070"/>
+              </a:tblGrid>
+              <a:tr h="370840">
+                <a:tc>
+                  <a:txBody>
+                    <a:bodyPr/>
+                    <a:lstStyle/>
+                    <a:p>
+                      <a:pPr algn="just"/>
+                      <a:r>
+                        <a:rPr lang="en-US" sz="1600" dirty="0" err="1" smtClean="0"/>
+                        <a:t>LogicManager</a:t>
+                      </a:r>
+                      <a:endParaRPr lang="en-US" sz="1600" dirty="0"/>
+                    </a:p>
+                  </a:txBody>
+                  <a:tcPr/>
+                </a:tc>
+              </a:tr>
+              <a:tr h="370840">
+                <a:tc>
+                  <a:txBody>
+                    <a:bodyPr/>
+                    <a:lstStyle/>
+                    <a:p>
+                      <a:pPr algn="ctr"/>
+                      <a:r>
+                        <a:rPr lang="mr-IN" dirty="0" smtClean="0"/>
+                        <a:t>…</a:t>
+                      </a:r>
+                      <a:endParaRPr lang="en-US" dirty="0"/>
+                    </a:p>
+                  </a:txBody>
+                  <a:tcPr/>
+                </a:tc>
+              </a:tr>
+              <a:tr h="370840">
+                <a:tc>
+                  <a:txBody>
+                    <a:bodyPr/>
+                    <a:lstStyle/>
+                    <a:p>
+                      <a:pPr algn="ctr"/>
+                      <a:r>
+                        <a:rPr lang="mr-IN" dirty="0" smtClean="0"/>
+                        <a:t>…</a:t>
+                      </a:r>
+                      <a:endParaRPr lang="en-US" dirty="0"/>
+                    </a:p>
+                  </a:txBody>
+                  <a:tcPr/>
+                </a:tc>
+              </a:tr>
+            </a:tbl>
+          </a:graphicData>
+        </a:graphic>
+      </p:graphicFrame>
       <p:cxnSp>
         <p:nvCxnSpPr>
-          <p:cNvPr id="9" name="Straight Arrow Connector 8"/>
+          <p:cNvPr id="7" name="Straight Arrow Connector 6"/>
           <p:cNvCxnSpPr>
-            <a:stCxn id="5" idx="2"/>
-            <a:endCxn id="6" idx="0"/>
+            <a:endCxn id="22" idx="0"/>
           </p:cNvCxnSpPr>
           <p:nvPr/>
         </p:nvCxnSpPr>
         <p:spPr>
           <a:xfrm>
-            <a:off x="2783367" y="1220469"/>
-            <a:ext cx="1" cy="492320"/>
+            <a:off x="2454066" y="2250061"/>
+            <a:ext cx="0" cy="373069"/>
           </a:xfrm>
           <a:prstGeom prst="straightConnector1">
             <a:avLst/>
           </a:prstGeom>
-          <a:ln w="38100">
-            <a:solidFill>
-              <a:schemeClr val="tx1"/>
-            </a:solidFill>
-            <a:tailEnd type="triangle"/>
-          </a:ln>
-        </p:spPr>
-        <p:style>
-          <a:lnRef idx="1">
-            <a:schemeClr val="accent1"/>
-          </a:lnRef>
-          <a:fillRef idx="0">
-            <a:schemeClr val="accent1"/>
-          </a:fillRef>
-          <a:effectRef idx="0">
-            <a:schemeClr val="accent1"/>
-          </a:effectRef>
-          <a:fontRef idx="minor">
-            <a:schemeClr val="tx1"/>
-          </a:fontRef>
-        </p:style>
-      </p:cxnSp>
-      <p:sp>
-        <p:nvSpPr>
-          <p:cNvPr id="15" name="TextBox 14"/>
-          <p:cNvSpPr txBox="1"/>
-          <p:nvPr/>
-        </p:nvSpPr>
-        <p:spPr>
-          <a:xfrm>
-            <a:off x="4477379" y="858834"/>
-            <a:ext cx="1537600" cy="369332"/>
-          </a:xfrm>
-          <a:prstGeom prst="rect">
-            <a:avLst/>
-          </a:prstGeom>
-        </p:spPr>
-        <p:style>
-          <a:lnRef idx="1">
-            <a:schemeClr val="accent3"/>
-          </a:lnRef>
-          <a:fillRef idx="2">
-            <a:schemeClr val="accent3"/>
-          </a:fillRef>
-          <a:effectRef idx="1">
-            <a:schemeClr val="accent3"/>
-          </a:effectRef>
-          <a:fontRef idx="minor">
-            <a:schemeClr val="dk1"/>
-          </a:fontRef>
-        </p:style>
-        <p:txBody>
-          <a:bodyPr wrap="none" rtlCol="0">
-            <a:spAutoFit/>
-          </a:bodyPr>
-          <a:lstStyle/>
-          <a:p>
-            <a:r>
-              <a:rPr lang="en-US" dirty="0"/>
-              <a:t>SortCommand</a:t>
-            </a:r>
-          </a:p>
-        </p:txBody>
-      </p:sp>
-      <p:sp>
-        <p:nvSpPr>
-          <p:cNvPr id="21" name="TextBox 20"/>
-          <p:cNvSpPr txBox="1"/>
-          <p:nvPr/>
-        </p:nvSpPr>
-        <p:spPr>
-          <a:xfrm>
-            <a:off x="8672293" y="1712789"/>
-            <a:ext cx="1819857" cy="369332"/>
-          </a:xfrm>
-          <a:prstGeom prst="rect">
-            <a:avLst/>
-          </a:prstGeom>
-        </p:spPr>
-        <p:style>
-          <a:lnRef idx="1">
-            <a:schemeClr val="accent6"/>
-          </a:lnRef>
-          <a:fillRef idx="2">
-            <a:schemeClr val="accent6"/>
-          </a:fillRef>
-          <a:effectRef idx="1">
-            <a:schemeClr val="accent6"/>
-          </a:effectRef>
-          <a:fontRef idx="minor">
-            <a:schemeClr val="dk1"/>
-          </a:fontRef>
-        </p:style>
-        <p:txBody>
-          <a:bodyPr wrap="none" rtlCol="0">
-            <a:spAutoFit/>
-          </a:bodyPr>
-          <a:lstStyle/>
-          <a:p>
-            <a:r>
-              <a:rPr lang="en-US" dirty="0"/>
-              <a:t>UniquePersonList</a:t>
-            </a:r>
-          </a:p>
-        </p:txBody>
-      </p:sp>
-      <p:cxnSp>
-        <p:nvCxnSpPr>
-          <p:cNvPr id="23" name="Straight Arrow Connector 22"/>
-          <p:cNvCxnSpPr>
-            <a:stCxn id="15" idx="3"/>
-          </p:cNvCxnSpPr>
-          <p:nvPr/>
-        </p:nvCxnSpPr>
-        <p:spPr>
-          <a:xfrm>
-            <a:off x="6014979" y="1043500"/>
-            <a:ext cx="585930" cy="0"/>
-          </a:xfrm>
-          <a:prstGeom prst="straightConnector1">
-            <a:avLst/>
-          </a:prstGeom>
-          <a:ln w="38100">
-            <a:solidFill>
-              <a:schemeClr val="tx1"/>
-            </a:solidFill>
-            <a:tailEnd type="triangle"/>
-          </a:ln>
-        </p:spPr>
-        <p:style>
-          <a:lnRef idx="1">
-            <a:schemeClr val="accent1"/>
-          </a:lnRef>
-          <a:fillRef idx="0">
-            <a:schemeClr val="accent1"/>
-          </a:fillRef>
-          <a:effectRef idx="0">
-            <a:schemeClr val="accent1"/>
-          </a:effectRef>
-          <a:fontRef idx="minor">
-            <a:schemeClr val="tx1"/>
-          </a:fontRef>
-        </p:style>
-      </p:cxnSp>
-      <p:sp>
-        <p:nvSpPr>
-          <p:cNvPr id="4" name="TextBox 3"/>
-          <p:cNvSpPr txBox="1"/>
-          <p:nvPr/>
-        </p:nvSpPr>
-        <p:spPr>
-          <a:xfrm>
-            <a:off x="6600909" y="858834"/>
-            <a:ext cx="1459246" cy="369332"/>
-          </a:xfrm>
-          <a:prstGeom prst="rect">
-            <a:avLst/>
-          </a:prstGeom>
-        </p:spPr>
-        <p:style>
-          <a:lnRef idx="1">
-            <a:schemeClr val="accent2"/>
-          </a:lnRef>
-          <a:fillRef idx="2">
-            <a:schemeClr val="accent2"/>
-          </a:fillRef>
-          <a:effectRef idx="1">
-            <a:schemeClr val="accent2"/>
-          </a:effectRef>
-          <a:fontRef idx="minor">
-            <a:schemeClr val="dk1"/>
-          </a:fontRef>
-        </p:style>
-        <p:txBody>
-          <a:bodyPr wrap="none" rtlCol="0">
-            <a:spAutoFit/>
-          </a:bodyPr>
-          <a:lstStyle/>
-          <a:p>
-            <a:pPr algn="ctr"/>
-            <a:r>
-              <a:rPr lang="en-US"/>
-              <a:t>AddressBook</a:t>
-            </a:r>
-            <a:endParaRPr lang="en-US" dirty="0"/>
-          </a:p>
-        </p:txBody>
-      </p:sp>
-      <p:cxnSp>
-        <p:nvCxnSpPr>
-          <p:cNvPr id="13" name="Straight Arrow Connector 12"/>
-          <p:cNvCxnSpPr>
-            <a:stCxn id="4" idx="3"/>
-            <a:endCxn id="21" idx="1"/>
-          </p:cNvCxnSpPr>
-          <p:nvPr/>
-        </p:nvCxnSpPr>
-        <p:spPr>
-          <a:xfrm>
-            <a:off x="8060156" y="1043501"/>
-            <a:ext cx="612137" cy="853955"/>
-          </a:xfrm>
-          <a:prstGeom prst="straightConnector1">
-            <a:avLst/>
-          </a:prstGeom>
-          <a:ln w="38100">
-            <a:solidFill>
-              <a:schemeClr val="tx1"/>
-            </a:solidFill>
-            <a:tailEnd type="triangle"/>
-          </a:ln>
-        </p:spPr>
-        <p:style>
-          <a:lnRef idx="1">
-            <a:schemeClr val="accent1"/>
-          </a:lnRef>
-          <a:fillRef idx="0">
-            <a:schemeClr val="accent1"/>
-          </a:fillRef>
-          <a:effectRef idx="0">
-            <a:schemeClr val="accent1"/>
-          </a:effectRef>
-          <a:fontRef idx="minor">
-            <a:schemeClr val="tx1"/>
-          </a:fontRef>
-        </p:style>
-      </p:cxnSp>
-      <p:sp>
-        <p:nvSpPr>
-          <p:cNvPr id="14" name="TextBox 13"/>
-          <p:cNvSpPr txBox="1"/>
-          <p:nvPr/>
-        </p:nvSpPr>
-        <p:spPr>
-          <a:xfrm>
-            <a:off x="4184414" y="1708154"/>
-            <a:ext cx="2123530" cy="369332"/>
-          </a:xfrm>
-          <a:prstGeom prst="rect">
-            <a:avLst/>
-          </a:prstGeom>
-        </p:spPr>
-        <p:style>
-          <a:lnRef idx="1">
-            <a:schemeClr val="accent5"/>
-          </a:lnRef>
-          <a:fillRef idx="3">
-            <a:schemeClr val="accent5"/>
-          </a:fillRef>
-          <a:effectRef idx="2">
-            <a:schemeClr val="accent5"/>
-          </a:effectRef>
-          <a:fontRef idx="minor">
-            <a:schemeClr val="lt1"/>
-          </a:fontRef>
-        </p:style>
-        <p:txBody>
-          <a:bodyPr wrap="none" rtlCol="0">
-            <a:spAutoFit/>
-          </a:bodyPr>
-          <a:lstStyle/>
-          <a:p>
-            <a:r>
-              <a:rPr lang="en-US" dirty="0"/>
-              <a:t>SortCommandParser</a:t>
-            </a:r>
-          </a:p>
-        </p:txBody>
-      </p:sp>
-      <p:cxnSp>
-        <p:nvCxnSpPr>
-          <p:cNvPr id="17" name="Straight Arrow Connector 16"/>
-          <p:cNvCxnSpPr>
-            <a:stCxn id="6" idx="3"/>
-            <a:endCxn id="14" idx="1"/>
-          </p:cNvCxnSpPr>
-          <p:nvPr/>
-        </p:nvCxnSpPr>
-        <p:spPr>
-          <a:xfrm flipV="1">
-            <a:off x="3810764" y="1892821"/>
-            <a:ext cx="373651" cy="4635"/>
-          </a:xfrm>
-          <a:prstGeom prst="straightConnector1">
-            <a:avLst/>
-          </a:prstGeom>
-          <a:ln w="38100">
+          <a:ln>
             <a:tailEnd type="triangle"/>
           </a:ln>
         </p:spPr>
@@ -3849,25 +4351,21 @@
       </p:cxnSp>
       <p:cxnSp>
         <p:nvCxnSpPr>
-          <p:cNvPr id="24" name="Straight Arrow Connector 23"/>
+          <p:cNvPr id="12" name="Straight Arrow Connector 11"/>
           <p:cNvCxnSpPr>
-            <a:stCxn id="14" idx="0"/>
-            <a:endCxn id="15" idx="2"/>
+            <a:endCxn id="18" idx="0"/>
           </p:cNvCxnSpPr>
           <p:nvPr/>
         </p:nvCxnSpPr>
         <p:spPr>
-          <a:xfrm flipV="1">
-            <a:off x="5246179" y="1228166"/>
-            <a:ext cx="0" cy="479988"/>
+          <a:xfrm>
+            <a:off x="2454066" y="3735650"/>
+            <a:ext cx="0" cy="439477"/>
           </a:xfrm>
           <a:prstGeom prst="straightConnector1">
             <a:avLst/>
           </a:prstGeom>
-          <a:ln w="38100">
-            <a:solidFill>
-              <a:schemeClr val="tx1"/>
-            </a:solidFill>
+          <a:ln>
             <a:tailEnd type="triangle"/>
           </a:ln>
         </p:spPr>
@@ -3886,6 +4384,158 @@
           </a:fontRef>
         </p:style>
       </p:cxnSp>
+      <p:cxnSp>
+        <p:nvCxnSpPr>
+          <p:cNvPr id="29" name="Straight Arrow Connector 28"/>
+          <p:cNvCxnSpPr>
+            <a:endCxn id="16" idx="1"/>
+          </p:cNvCxnSpPr>
+          <p:nvPr/>
+        </p:nvCxnSpPr>
+        <p:spPr>
+          <a:xfrm flipV="1">
+            <a:off x="3596101" y="2623130"/>
+            <a:ext cx="679844" cy="1922837"/>
+          </a:xfrm>
+          <a:prstGeom prst="straightConnector1">
+            <a:avLst/>
+          </a:prstGeom>
+          <a:ln>
+            <a:tailEnd type="triangle"/>
+          </a:ln>
+        </p:spPr>
+        <p:style>
+          <a:lnRef idx="1">
+            <a:schemeClr val="accent1"/>
+          </a:lnRef>
+          <a:fillRef idx="0">
+            <a:schemeClr val="accent1"/>
+          </a:fillRef>
+          <a:effectRef idx="0">
+            <a:schemeClr val="accent1"/>
+          </a:effectRef>
+          <a:fontRef idx="minor">
+            <a:schemeClr val="tx1"/>
+          </a:fontRef>
+        </p:style>
+      </p:cxnSp>
+      <p:cxnSp>
+        <p:nvCxnSpPr>
+          <p:cNvPr id="31" name="Straight Arrow Connector 30"/>
+          <p:cNvCxnSpPr>
+            <a:endCxn id="19" idx="1"/>
+          </p:cNvCxnSpPr>
+          <p:nvPr/>
+        </p:nvCxnSpPr>
+        <p:spPr>
+          <a:xfrm flipV="1">
+            <a:off x="5944597" y="2504118"/>
+            <a:ext cx="697368" cy="346342"/>
+          </a:xfrm>
+          <a:prstGeom prst="straightConnector1">
+            <a:avLst/>
+          </a:prstGeom>
+          <a:ln>
+            <a:tailEnd type="triangle"/>
+          </a:ln>
+        </p:spPr>
+        <p:style>
+          <a:lnRef idx="1">
+            <a:schemeClr val="accent1"/>
+          </a:lnRef>
+          <a:fillRef idx="0">
+            <a:schemeClr val="accent1"/>
+          </a:fillRef>
+          <a:effectRef idx="0">
+            <a:schemeClr val="accent1"/>
+          </a:effectRef>
+          <a:fontRef idx="minor">
+            <a:schemeClr val="tx1"/>
+          </a:fontRef>
+        </p:style>
+      </p:cxnSp>
+      <p:cxnSp>
+        <p:nvCxnSpPr>
+          <p:cNvPr id="33" name="Straight Arrow Connector 32"/>
+          <p:cNvCxnSpPr>
+            <a:endCxn id="20" idx="0"/>
+          </p:cNvCxnSpPr>
+          <p:nvPr/>
+        </p:nvCxnSpPr>
+        <p:spPr>
+          <a:xfrm flipH="1">
+            <a:off x="7425545" y="3849740"/>
+            <a:ext cx="1368500" cy="325387"/>
+          </a:xfrm>
+          <a:prstGeom prst="straightConnector1">
+            <a:avLst/>
+          </a:prstGeom>
+          <a:ln>
+            <a:tailEnd type="triangle"/>
+          </a:ln>
+        </p:spPr>
+        <p:style>
+          <a:lnRef idx="1">
+            <a:schemeClr val="accent1"/>
+          </a:lnRef>
+          <a:fillRef idx="0">
+            <a:schemeClr val="accent1"/>
+          </a:fillRef>
+          <a:effectRef idx="0">
+            <a:schemeClr val="accent1"/>
+          </a:effectRef>
+          <a:fontRef idx="minor">
+            <a:schemeClr val="tx1"/>
+          </a:fontRef>
+        </p:style>
+      </p:cxnSp>
+      <p:sp>
+        <p:nvSpPr>
+          <p:cNvPr id="35" name="TextBox 34"/>
+          <p:cNvSpPr txBox="1"/>
+          <p:nvPr/>
+        </p:nvSpPr>
+        <p:spPr>
+          <a:xfrm>
+            <a:off x="474133" y="393564"/>
+            <a:ext cx="3153620" cy="369332"/>
+          </a:xfrm>
+          <a:prstGeom prst="rect">
+            <a:avLst/>
+          </a:prstGeom>
+        </p:spPr>
+        <p:style>
+          <a:lnRef idx="2">
+            <a:schemeClr val="dk1"/>
+          </a:lnRef>
+          <a:fillRef idx="1">
+            <a:schemeClr val="lt1"/>
+          </a:fillRef>
+          <a:effectRef idx="0">
+            <a:schemeClr val="dk1"/>
+          </a:effectRef>
+          <a:fontRef idx="minor">
+            <a:schemeClr val="dk1"/>
+          </a:fontRef>
+        </p:style>
+        <p:txBody>
+          <a:bodyPr wrap="none" rtlCol="0">
+            <a:spAutoFit/>
+          </a:bodyPr>
+          <a:lstStyle/>
+          <a:p>
+            <a:r>
+              <a:rPr lang="en-US" dirty="0" smtClean="0"/>
+              <a:t>UML </a:t>
+            </a:r>
+            <a:r>
+              <a:rPr lang="en-US" smtClean="0"/>
+              <a:t>Outline for Sort Command</a:t>
+            </a:r>
+            <a:endParaRPr lang="en-US"/>
+          </a:p>
+        </p:txBody>
+      </p:sp>
     </p:spTree>
     <p:extLst>
       <p:ext uri="{BB962C8B-B14F-4D97-AF65-F5344CB8AC3E}">
@@ -3907,6 +4557,569 @@
 </file>
 
 <file path=ppt/slides/slide2.xml><?xml version="1.0" encoding="utf-8"?>
+<p:sld xmlns:a="http://schemas.openxmlformats.org/drawingml/2006/main" xmlns:r="http://schemas.openxmlformats.org/officeDocument/2006/relationships" xmlns:p="http://schemas.openxmlformats.org/presentationml/2006/main">
+  <p:cSld>
+    <p:spTree>
+      <p:nvGrpSpPr>
+        <p:cNvPr id="1" name=""/>
+        <p:cNvGrpSpPr/>
+        <p:nvPr/>
+      </p:nvGrpSpPr>
+      <p:grpSpPr>
+        <a:xfrm>
+          <a:off x="0" y="0"/>
+          <a:ext cx="0" cy="0"/>
+          <a:chOff x="0" y="0"/>
+          <a:chExt cx="0" cy="0"/>
+        </a:xfrm>
+      </p:grpSpPr>
+      <p:sp>
+        <p:nvSpPr>
+          <p:cNvPr id="16" name="Rectangle 15"/>
+          <p:cNvSpPr/>
+          <p:nvPr/>
+        </p:nvSpPr>
+        <p:spPr>
+          <a:xfrm>
+            <a:off x="1639749" y="358816"/>
+            <a:ext cx="8935654" cy="2013994"/>
+          </a:xfrm>
+          <a:prstGeom prst="rect">
+            <a:avLst/>
+          </a:prstGeom>
+          <a:noFill/>
+        </p:spPr>
+        <p:style>
+          <a:lnRef idx="2">
+            <a:schemeClr val="accent6"/>
+          </a:lnRef>
+          <a:fillRef idx="1">
+            <a:schemeClr val="lt1"/>
+          </a:fillRef>
+          <a:effectRef idx="0">
+            <a:schemeClr val="accent6"/>
+          </a:effectRef>
+          <a:fontRef idx="minor">
+            <a:schemeClr val="dk1"/>
+          </a:fontRef>
+        </p:style>
+        <p:txBody>
+          <a:bodyPr rtlCol="0" anchor="ctr"/>
+          <a:lstStyle/>
+          <a:p>
+            <a:pPr algn="ctr"/>
+            <a:endParaRPr lang="en-US"/>
+          </a:p>
+        </p:txBody>
+      </p:sp>
+      <p:sp>
+        <p:nvSpPr>
+          <p:cNvPr id="18" name="TextBox 17"/>
+          <p:cNvSpPr txBox="1"/>
+          <p:nvPr/>
+        </p:nvSpPr>
+        <p:spPr>
+          <a:xfrm>
+            <a:off x="1639749" y="358815"/>
+            <a:ext cx="1782499" cy="369332"/>
+          </a:xfrm>
+          <a:prstGeom prst="rect">
+            <a:avLst/>
+          </a:prstGeom>
+          <a:noFill/>
+        </p:spPr>
+        <p:style>
+          <a:lnRef idx="2">
+            <a:schemeClr val="accent6"/>
+          </a:lnRef>
+          <a:fillRef idx="1">
+            <a:schemeClr val="lt1"/>
+          </a:fillRef>
+          <a:effectRef idx="0">
+            <a:schemeClr val="accent6"/>
+          </a:effectRef>
+          <a:fontRef idx="minor">
+            <a:schemeClr val="dk1"/>
+          </a:fontRef>
+        </p:style>
+        <p:txBody>
+          <a:bodyPr wrap="square" rtlCol="0">
+            <a:spAutoFit/>
+          </a:bodyPr>
+          <a:lstStyle/>
+          <a:p>
+            <a:pPr algn="ctr"/>
+            <a:r>
+              <a:rPr lang="en-US"/>
+              <a:t>Sort Mechanism</a:t>
+            </a:r>
+            <a:endParaRPr lang="en-US" dirty="0"/>
+          </a:p>
+        </p:txBody>
+      </p:sp>
+      <p:sp>
+        <p:nvSpPr>
+          <p:cNvPr id="19" name="TextBox 18"/>
+          <p:cNvSpPr txBox="1"/>
+          <p:nvPr/>
+        </p:nvSpPr>
+        <p:spPr>
+          <a:xfrm>
+            <a:off x="2003473" y="851137"/>
+            <a:ext cx="1559786" cy="369332"/>
+          </a:xfrm>
+          <a:prstGeom prst="rect">
+            <a:avLst/>
+          </a:prstGeom>
+        </p:spPr>
+        <p:style>
+          <a:lnRef idx="1">
+            <a:schemeClr val="accent4"/>
+          </a:lnRef>
+          <a:fillRef idx="2">
+            <a:schemeClr val="accent4"/>
+          </a:fillRef>
+          <a:effectRef idx="1">
+            <a:schemeClr val="accent4"/>
+          </a:effectRef>
+          <a:fontRef idx="minor">
+            <a:schemeClr val="dk1"/>
+          </a:fontRef>
+        </p:style>
+        <p:txBody>
+          <a:bodyPr wrap="none" rtlCol="0">
+            <a:spAutoFit/>
+          </a:bodyPr>
+          <a:lstStyle/>
+          <a:p>
+            <a:pPr algn="ctr"/>
+            <a:r>
+              <a:rPr lang="en-US" dirty="0"/>
+              <a:t>:LogicManager</a:t>
+            </a:r>
+          </a:p>
+        </p:txBody>
+      </p:sp>
+      <p:sp>
+        <p:nvSpPr>
+          <p:cNvPr id="20" name="TextBox 19"/>
+          <p:cNvSpPr txBox="1"/>
+          <p:nvPr/>
+        </p:nvSpPr>
+        <p:spPr>
+          <a:xfrm>
+            <a:off x="1755971" y="1712789"/>
+            <a:ext cx="2054793" cy="369332"/>
+          </a:xfrm>
+          <a:prstGeom prst="rect">
+            <a:avLst/>
+          </a:prstGeom>
+        </p:spPr>
+        <p:style>
+          <a:lnRef idx="1">
+            <a:schemeClr val="accent5"/>
+          </a:lnRef>
+          <a:fillRef idx="2">
+            <a:schemeClr val="accent5"/>
+          </a:fillRef>
+          <a:effectRef idx="1">
+            <a:schemeClr val="accent5"/>
+          </a:effectRef>
+          <a:fontRef idx="minor">
+            <a:schemeClr val="dk1"/>
+          </a:fontRef>
+        </p:style>
+        <p:txBody>
+          <a:bodyPr wrap="none" rtlCol="0">
+            <a:spAutoFit/>
+          </a:bodyPr>
+          <a:lstStyle/>
+          <a:p>
+            <a:r>
+              <a:rPr lang="en-US" dirty="0"/>
+              <a:t>:AddressBookParser</a:t>
+            </a:r>
+          </a:p>
+        </p:txBody>
+      </p:sp>
+      <p:cxnSp>
+        <p:nvCxnSpPr>
+          <p:cNvPr id="22" name="Straight Arrow Connector 21"/>
+          <p:cNvCxnSpPr>
+            <a:stCxn id="20" idx="2"/>
+            <a:endCxn id="22" idx="0"/>
+          </p:cNvCxnSpPr>
+          <p:nvPr/>
+        </p:nvCxnSpPr>
+        <p:spPr>
+          <a:xfrm>
+            <a:off x="2783367" y="1220469"/>
+            <a:ext cx="1" cy="492320"/>
+          </a:xfrm>
+          <a:prstGeom prst="straightConnector1">
+            <a:avLst/>
+          </a:prstGeom>
+          <a:ln w="38100">
+            <a:solidFill>
+              <a:schemeClr val="tx1"/>
+            </a:solidFill>
+            <a:tailEnd type="triangle"/>
+          </a:ln>
+        </p:spPr>
+        <p:style>
+          <a:lnRef idx="1">
+            <a:schemeClr val="accent1"/>
+          </a:lnRef>
+          <a:fillRef idx="0">
+            <a:schemeClr val="accent1"/>
+          </a:fillRef>
+          <a:effectRef idx="0">
+            <a:schemeClr val="accent1"/>
+          </a:effectRef>
+          <a:fontRef idx="minor">
+            <a:schemeClr val="tx1"/>
+          </a:fontRef>
+        </p:style>
+      </p:cxnSp>
+      <p:sp>
+        <p:nvSpPr>
+          <p:cNvPr id="25" name="TextBox 24"/>
+          <p:cNvSpPr txBox="1"/>
+          <p:nvPr/>
+        </p:nvSpPr>
+        <p:spPr>
+          <a:xfrm>
+            <a:off x="4477379" y="858834"/>
+            <a:ext cx="1537600" cy="369332"/>
+          </a:xfrm>
+          <a:prstGeom prst="rect">
+            <a:avLst/>
+          </a:prstGeom>
+        </p:spPr>
+        <p:style>
+          <a:lnRef idx="1">
+            <a:schemeClr val="accent3"/>
+          </a:lnRef>
+          <a:fillRef idx="2">
+            <a:schemeClr val="accent3"/>
+          </a:fillRef>
+          <a:effectRef idx="1">
+            <a:schemeClr val="accent3"/>
+          </a:effectRef>
+          <a:fontRef idx="minor">
+            <a:schemeClr val="dk1"/>
+          </a:fontRef>
+        </p:style>
+        <p:txBody>
+          <a:bodyPr wrap="none" rtlCol="0">
+            <a:spAutoFit/>
+          </a:bodyPr>
+          <a:lstStyle/>
+          <a:p>
+            <a:r>
+              <a:rPr lang="en-US" dirty="0"/>
+              <a:t>SortCommand</a:t>
+            </a:r>
+          </a:p>
+        </p:txBody>
+      </p:sp>
+      <p:sp>
+        <p:nvSpPr>
+          <p:cNvPr id="26" name="TextBox 25"/>
+          <p:cNvSpPr txBox="1"/>
+          <p:nvPr/>
+        </p:nvSpPr>
+        <p:spPr>
+          <a:xfrm>
+            <a:off x="8672293" y="1712789"/>
+            <a:ext cx="1819857" cy="369332"/>
+          </a:xfrm>
+          <a:prstGeom prst="rect">
+            <a:avLst/>
+          </a:prstGeom>
+        </p:spPr>
+        <p:style>
+          <a:lnRef idx="1">
+            <a:schemeClr val="accent6"/>
+          </a:lnRef>
+          <a:fillRef idx="2">
+            <a:schemeClr val="accent6"/>
+          </a:fillRef>
+          <a:effectRef idx="1">
+            <a:schemeClr val="accent6"/>
+          </a:effectRef>
+          <a:fontRef idx="minor">
+            <a:schemeClr val="dk1"/>
+          </a:fontRef>
+        </p:style>
+        <p:txBody>
+          <a:bodyPr wrap="none" rtlCol="0">
+            <a:spAutoFit/>
+          </a:bodyPr>
+          <a:lstStyle/>
+          <a:p>
+            <a:r>
+              <a:rPr lang="en-US" dirty="0"/>
+              <a:t>UniquePersonList</a:t>
+            </a:r>
+          </a:p>
+        </p:txBody>
+      </p:sp>
+      <p:cxnSp>
+        <p:nvCxnSpPr>
+          <p:cNvPr id="27" name="Straight Arrow Connector 26"/>
+          <p:cNvCxnSpPr/>
+          <p:nvPr/>
+        </p:nvCxnSpPr>
+        <p:spPr>
+          <a:xfrm>
+            <a:off x="6014979" y="1043500"/>
+            <a:ext cx="585930" cy="0"/>
+          </a:xfrm>
+          <a:prstGeom prst="straightConnector1">
+            <a:avLst/>
+          </a:prstGeom>
+          <a:ln w="38100">
+            <a:solidFill>
+              <a:schemeClr val="tx1"/>
+            </a:solidFill>
+            <a:tailEnd type="triangle"/>
+          </a:ln>
+        </p:spPr>
+        <p:style>
+          <a:lnRef idx="1">
+            <a:schemeClr val="accent1"/>
+          </a:lnRef>
+          <a:fillRef idx="0">
+            <a:schemeClr val="accent1"/>
+          </a:fillRef>
+          <a:effectRef idx="0">
+            <a:schemeClr val="accent1"/>
+          </a:effectRef>
+          <a:fontRef idx="minor">
+            <a:schemeClr val="tx1"/>
+          </a:fontRef>
+        </p:style>
+      </p:cxnSp>
+      <p:sp>
+        <p:nvSpPr>
+          <p:cNvPr id="28" name="TextBox 27"/>
+          <p:cNvSpPr txBox="1"/>
+          <p:nvPr/>
+        </p:nvSpPr>
+        <p:spPr>
+          <a:xfrm>
+            <a:off x="6600909" y="858834"/>
+            <a:ext cx="1459246" cy="369332"/>
+          </a:xfrm>
+          <a:prstGeom prst="rect">
+            <a:avLst/>
+          </a:prstGeom>
+        </p:spPr>
+        <p:style>
+          <a:lnRef idx="1">
+            <a:schemeClr val="accent2"/>
+          </a:lnRef>
+          <a:fillRef idx="2">
+            <a:schemeClr val="accent2"/>
+          </a:fillRef>
+          <a:effectRef idx="1">
+            <a:schemeClr val="accent2"/>
+          </a:effectRef>
+          <a:fontRef idx="minor">
+            <a:schemeClr val="dk1"/>
+          </a:fontRef>
+        </p:style>
+        <p:txBody>
+          <a:bodyPr wrap="none" rtlCol="0">
+            <a:spAutoFit/>
+          </a:bodyPr>
+          <a:lstStyle/>
+          <a:p>
+            <a:pPr algn="ctr"/>
+            <a:r>
+              <a:rPr lang="en-US"/>
+              <a:t>AddressBook</a:t>
+            </a:r>
+            <a:endParaRPr lang="en-US" dirty="0"/>
+          </a:p>
+        </p:txBody>
+      </p:sp>
+      <p:cxnSp>
+        <p:nvCxnSpPr>
+          <p:cNvPr id="29" name="Straight Arrow Connector 28"/>
+          <p:cNvCxnSpPr>
+            <a:stCxn id="19" idx="3"/>
+          </p:cNvCxnSpPr>
+          <p:nvPr/>
+        </p:nvCxnSpPr>
+        <p:spPr>
+          <a:xfrm>
+            <a:off x="8060156" y="1043501"/>
+            <a:ext cx="612137" cy="853955"/>
+          </a:xfrm>
+          <a:prstGeom prst="straightConnector1">
+            <a:avLst/>
+          </a:prstGeom>
+          <a:ln w="38100">
+            <a:solidFill>
+              <a:schemeClr val="tx1"/>
+            </a:solidFill>
+            <a:tailEnd type="triangle"/>
+          </a:ln>
+        </p:spPr>
+        <p:style>
+          <a:lnRef idx="1">
+            <a:schemeClr val="accent1"/>
+          </a:lnRef>
+          <a:fillRef idx="0">
+            <a:schemeClr val="accent1"/>
+          </a:fillRef>
+          <a:effectRef idx="0">
+            <a:schemeClr val="accent1"/>
+          </a:effectRef>
+          <a:fontRef idx="minor">
+            <a:schemeClr val="tx1"/>
+          </a:fontRef>
+        </p:style>
+      </p:cxnSp>
+      <p:sp>
+        <p:nvSpPr>
+          <p:cNvPr id="30" name="TextBox 29"/>
+          <p:cNvSpPr txBox="1"/>
+          <p:nvPr/>
+        </p:nvSpPr>
+        <p:spPr>
+          <a:xfrm>
+            <a:off x="4184414" y="1708154"/>
+            <a:ext cx="2123530" cy="369332"/>
+          </a:xfrm>
+          <a:prstGeom prst="rect">
+            <a:avLst/>
+          </a:prstGeom>
+        </p:spPr>
+        <p:style>
+          <a:lnRef idx="1">
+            <a:schemeClr val="accent5"/>
+          </a:lnRef>
+          <a:fillRef idx="3">
+            <a:schemeClr val="accent5"/>
+          </a:fillRef>
+          <a:effectRef idx="2">
+            <a:schemeClr val="accent5"/>
+          </a:effectRef>
+          <a:fontRef idx="minor">
+            <a:schemeClr val="lt1"/>
+          </a:fontRef>
+        </p:style>
+        <p:txBody>
+          <a:bodyPr wrap="none" rtlCol="0">
+            <a:spAutoFit/>
+          </a:bodyPr>
+          <a:lstStyle/>
+          <a:p>
+            <a:r>
+              <a:rPr lang="en-US" dirty="0"/>
+              <a:t>SortCommandParser</a:t>
+            </a:r>
+          </a:p>
+        </p:txBody>
+      </p:sp>
+      <p:cxnSp>
+        <p:nvCxnSpPr>
+          <p:cNvPr id="31" name="Straight Arrow Connector 30"/>
+          <p:cNvCxnSpPr>
+            <a:stCxn id="22" idx="3"/>
+            <a:endCxn id="32" idx="1"/>
+          </p:cNvCxnSpPr>
+          <p:nvPr/>
+        </p:nvCxnSpPr>
+        <p:spPr>
+          <a:xfrm flipV="1">
+            <a:off x="3810764" y="1892821"/>
+            <a:ext cx="373651" cy="4635"/>
+          </a:xfrm>
+          <a:prstGeom prst="straightConnector1">
+            <a:avLst/>
+          </a:prstGeom>
+          <a:ln w="38100">
+            <a:tailEnd type="triangle"/>
+          </a:ln>
+        </p:spPr>
+        <p:style>
+          <a:lnRef idx="1">
+            <a:schemeClr val="accent1"/>
+          </a:lnRef>
+          <a:fillRef idx="0">
+            <a:schemeClr val="accent1"/>
+          </a:fillRef>
+          <a:effectRef idx="0">
+            <a:schemeClr val="accent1"/>
+          </a:effectRef>
+          <a:fontRef idx="minor">
+            <a:schemeClr val="tx1"/>
+          </a:fontRef>
+        </p:style>
+      </p:cxnSp>
+      <p:cxnSp>
+        <p:nvCxnSpPr>
+          <p:cNvPr id="32" name="Straight Arrow Connector 31"/>
+          <p:cNvCxnSpPr>
+            <a:stCxn id="32" idx="0"/>
+          </p:cNvCxnSpPr>
+          <p:nvPr/>
+        </p:nvCxnSpPr>
+        <p:spPr>
+          <a:xfrm flipV="1">
+            <a:off x="5246179" y="1228166"/>
+            <a:ext cx="0" cy="479988"/>
+          </a:xfrm>
+          <a:prstGeom prst="straightConnector1">
+            <a:avLst/>
+          </a:prstGeom>
+          <a:ln w="38100">
+            <a:solidFill>
+              <a:schemeClr val="tx1"/>
+            </a:solidFill>
+            <a:tailEnd type="triangle"/>
+          </a:ln>
+        </p:spPr>
+        <p:style>
+          <a:lnRef idx="1">
+            <a:schemeClr val="accent1"/>
+          </a:lnRef>
+          <a:fillRef idx="0">
+            <a:schemeClr val="accent1"/>
+          </a:fillRef>
+          <a:effectRef idx="0">
+            <a:schemeClr val="accent1"/>
+          </a:effectRef>
+          <a:fontRef idx="minor">
+            <a:schemeClr val="tx1"/>
+          </a:fontRef>
+        </p:style>
+      </p:cxnSp>
+    </p:spTree>
+    <p:extLst>
+      <p:ext uri="{BB962C8B-B14F-4D97-AF65-F5344CB8AC3E}">
+        <p14:creationId xmlns:p14="http://schemas.microsoft.com/office/powerpoint/2010/main" val="1713182630"/>
+      </p:ext>
+    </p:extLst>
+  </p:cSld>
+  <p:clrMapOvr>
+    <a:masterClrMapping/>
+  </p:clrMapOvr>
+  <p:timing>
+    <p:tnLst>
+      <p:par>
+        <p:cTn id="1" dur="indefinite" restart="never" nodeType="tmRoot"/>
+      </p:par>
+    </p:tnLst>
+  </p:timing>
+</p:sld>
+</file>
+
+<file path=ppt/slides/slide3.xml><?xml version="1.0" encoding="utf-8"?>
 <p:sld xmlns:a="http://schemas.openxmlformats.org/drawingml/2006/main" xmlns:r="http://schemas.openxmlformats.org/officeDocument/2006/relationships" xmlns:p="http://schemas.openxmlformats.org/presentationml/2006/main">
   <p:cSld>
     <p:spTree>

</xml_diff>

<commit_message>
[SORT][DEVDOCS] Updated sort command dev docs with UML outline and corrected sequence diagram
</commit_message>
<xml_diff>
--- a/docs/diagrams/SortCommandDiagrams.pptx
+++ b/docs/diagrams/SortCommandDiagrams.pptx
@@ -3404,7 +3404,7 @@
           <p:nvPr>
             <p:extLst>
               <p:ext uri="{D42A27DB-BD31-4B8C-83A1-F6EECF244321}">
-                <p14:modId xmlns:p14="http://schemas.microsoft.com/office/powerpoint/2010/main" val="1647955541"/>
+                <p14:modId xmlns:p14="http://schemas.microsoft.com/office/powerpoint/2010/main" val="1499011173"/>
               </p:ext>
             </p:extLst>
           </p:nvPr>
@@ -3527,7 +3527,7 @@
           <p:nvPr>
             <p:extLst>
               <p:ext uri="{D42A27DB-BD31-4B8C-83A1-F6EECF244321}">
-                <p14:modId xmlns:p14="http://schemas.microsoft.com/office/powerpoint/2010/main" val="1092182228"/>
+                <p14:modId xmlns:p14="http://schemas.microsoft.com/office/powerpoint/2010/main" val="1750121654"/>
               </p:ext>
             </p:extLst>
           </p:nvPr>
@@ -3604,7 +3604,7 @@
           <p:nvPr>
             <p:extLst>
               <p:ext uri="{D42A27DB-BD31-4B8C-83A1-F6EECF244321}">
-                <p14:modId xmlns:p14="http://schemas.microsoft.com/office/powerpoint/2010/main" val="1763975087"/>
+                <p14:modId xmlns:p14="http://schemas.microsoft.com/office/powerpoint/2010/main" val="211125819"/>
               </p:ext>
             </p:extLst>
           </p:nvPr>
@@ -3866,7 +3866,7 @@
           <p:nvPr>
             <p:extLst>
               <p:ext uri="{D42A27DB-BD31-4B8C-83A1-F6EECF244321}">
-                <p14:modId xmlns:p14="http://schemas.microsoft.com/office/powerpoint/2010/main" val="1117540374"/>
+                <p14:modId xmlns:p14="http://schemas.microsoft.com/office/powerpoint/2010/main" val="748655089"/>
               </p:ext>
             </p:extLst>
           </p:nvPr>
@@ -4159,7 +4159,7 @@
           <p:nvPr>
             <p:extLst>
               <p:ext uri="{D42A27DB-BD31-4B8C-83A1-F6EECF244321}">
-                <p14:modId xmlns:p14="http://schemas.microsoft.com/office/powerpoint/2010/main" val="609089156"/>
+                <p14:modId xmlns:p14="http://schemas.microsoft.com/office/powerpoint/2010/main" val="539393050"/>
               </p:ext>
             </p:extLst>
           </p:nvPr>
@@ -4241,7 +4241,7 @@
           <p:nvPr>
             <p:extLst>
               <p:ext uri="{D42A27DB-BD31-4B8C-83A1-F6EECF244321}">
-                <p14:modId xmlns:p14="http://schemas.microsoft.com/office/powerpoint/2010/main" val="2054383290"/>
+                <p14:modId xmlns:p14="http://schemas.microsoft.com/office/powerpoint/2010/main" val="1050517363"/>
               </p:ext>
             </p:extLst>
           </p:nvPr>
@@ -5391,7 +5391,7 @@
         <p:spPr>
           <a:xfrm>
             <a:off x="2090495" y="953001"/>
-            <a:ext cx="0" cy="5857850"/>
+            <a:ext cx="0" cy="5741034"/>
           </a:xfrm>
           <a:prstGeom prst="line">
             <a:avLst/>
@@ -5468,7 +5468,7 @@
         </p:nvCxnSpPr>
         <p:spPr>
           <a:xfrm>
-            <a:off x="467309" y="1248369"/>
+            <a:off x="467309" y="1105964"/>
             <a:ext cx="1524387" cy="0"/>
           </a:xfrm>
           <a:prstGeom prst="straightConnector1">
@@ -5504,7 +5504,7 @@
         </p:nvSpPr>
         <p:spPr>
           <a:xfrm>
-            <a:off x="417226" y="1002148"/>
+            <a:off x="424760" y="1084012"/>
             <a:ext cx="1574470" cy="246221"/>
           </a:xfrm>
           <a:prstGeom prst="rect">
@@ -5775,8 +5775,8 @@
         </p:nvSpPr>
         <p:spPr>
           <a:xfrm>
-            <a:off x="4166600" y="1226012"/>
-            <a:ext cx="1213794" cy="246221"/>
+            <a:off x="4115918" y="1048590"/>
+            <a:ext cx="1590500" cy="246221"/>
           </a:xfrm>
           <a:prstGeom prst="rect">
             <a:avLst/>
@@ -5791,16 +5791,12 @@
           <a:p>
             <a:pPr algn="ctr"/>
             <a:r>
-              <a:rPr lang="en-US" sz="1000" smtClean="0"/>
-              <a:t>parse(“name </a:t>
-            </a:r>
-            <a:r>
               <a:rPr lang="en-US" sz="1000" dirty="0" err="1" smtClean="0"/>
-              <a:t>desc</a:t>
+              <a:t>SortCommand</a:t>
             </a:r>
             <a:r>
               <a:rPr lang="en-US" sz="1000" dirty="0" smtClean="0"/>
-              <a:t>”)</a:t>
+              <a:t>(field, order)</a:t>
             </a:r>
             <a:endParaRPr lang="en-US" sz="1000" dirty="0"/>
           </a:p>
@@ -6630,6 +6626,13 @@
   <p:clrMapOvr>
     <a:masterClrMapping/>
   </p:clrMapOvr>
+  <p:timing>
+    <p:tnLst>
+      <p:par>
+        <p:cTn id="1" dur="indefinite" restart="never" nodeType="tmRoot"/>
+      </p:par>
+    </p:tnLst>
+  </p:timing>
 </p:sld>
 </file>
 

</xml_diff>

<commit_message>
[DOCS] Made changes to standardize code/docs
</commit_message>
<xml_diff>
--- a/docs/diagrams/SortCommandDiagrams.pptx
+++ b/docs/diagrams/SortCommandDiagrams.pptx
@@ -199,7 +199,7 @@
           <a:p>
             <a:fld id="{756A9B74-E80F-5C4E-A7DD-E49C20F7C5ED}" type="datetimeFigureOut">
               <a:rPr lang="en-US" smtClean="0"/>
-              <a:t>10/29/17</a:t>
+              <a:t>10/31/17</a:t>
             </a:fld>
             <a:endParaRPr lang="en-US"/>
           </a:p>
@@ -682,7 +682,7 @@
           <a:p>
             <a:fld id="{4C707D6F-0D04-EC44-A702-F7C7F0C5C2B0}" type="datetimeFigureOut">
               <a:rPr lang="en-US" smtClean="0"/>
-              <a:t>10/29/17</a:t>
+              <a:t>10/31/17</a:t>
             </a:fld>
             <a:endParaRPr lang="en-US"/>
           </a:p>
@@ -847,7 +847,7 @@
           <a:p>
             <a:fld id="{4C707D6F-0D04-EC44-A702-F7C7F0C5C2B0}" type="datetimeFigureOut">
               <a:rPr lang="en-US" smtClean="0"/>
-              <a:t>10/29/17</a:t>
+              <a:t>10/31/17</a:t>
             </a:fld>
             <a:endParaRPr lang="en-US"/>
           </a:p>
@@ -1022,7 +1022,7 @@
           <a:p>
             <a:fld id="{4C707D6F-0D04-EC44-A702-F7C7F0C5C2B0}" type="datetimeFigureOut">
               <a:rPr lang="en-US" smtClean="0"/>
-              <a:t>10/29/17</a:t>
+              <a:t>10/31/17</a:t>
             </a:fld>
             <a:endParaRPr lang="en-US"/>
           </a:p>
@@ -1187,7 +1187,7 @@
           <a:p>
             <a:fld id="{4C707D6F-0D04-EC44-A702-F7C7F0C5C2B0}" type="datetimeFigureOut">
               <a:rPr lang="en-US" smtClean="0"/>
-              <a:t>10/29/17</a:t>
+              <a:t>10/31/17</a:t>
             </a:fld>
             <a:endParaRPr lang="en-US"/>
           </a:p>
@@ -1428,7 +1428,7 @@
           <a:p>
             <a:fld id="{4C707D6F-0D04-EC44-A702-F7C7F0C5C2B0}" type="datetimeFigureOut">
               <a:rPr lang="en-US" smtClean="0"/>
-              <a:t>10/29/17</a:t>
+              <a:t>10/31/17</a:t>
             </a:fld>
             <a:endParaRPr lang="en-US"/>
           </a:p>
@@ -1655,7 +1655,7 @@
           <a:p>
             <a:fld id="{4C707D6F-0D04-EC44-A702-F7C7F0C5C2B0}" type="datetimeFigureOut">
               <a:rPr lang="en-US" smtClean="0"/>
-              <a:t>10/29/17</a:t>
+              <a:t>10/31/17</a:t>
             </a:fld>
             <a:endParaRPr lang="en-US"/>
           </a:p>
@@ -2017,7 +2017,7 @@
           <a:p>
             <a:fld id="{4C707D6F-0D04-EC44-A702-F7C7F0C5C2B0}" type="datetimeFigureOut">
               <a:rPr lang="en-US" smtClean="0"/>
-              <a:t>10/29/17</a:t>
+              <a:t>10/31/17</a:t>
             </a:fld>
             <a:endParaRPr lang="en-US"/>
           </a:p>
@@ -2130,7 +2130,7 @@
           <a:p>
             <a:fld id="{4C707D6F-0D04-EC44-A702-F7C7F0C5C2B0}" type="datetimeFigureOut">
               <a:rPr lang="en-US" smtClean="0"/>
-              <a:t>10/29/17</a:t>
+              <a:t>10/31/17</a:t>
             </a:fld>
             <a:endParaRPr lang="en-US"/>
           </a:p>
@@ -2220,7 +2220,7 @@
           <a:p>
             <a:fld id="{4C707D6F-0D04-EC44-A702-F7C7F0C5C2B0}" type="datetimeFigureOut">
               <a:rPr lang="en-US" smtClean="0"/>
-              <a:t>10/29/17</a:t>
+              <a:t>10/31/17</a:t>
             </a:fld>
             <a:endParaRPr lang="en-US"/>
           </a:p>
@@ -2492,7 +2492,7 @@
           <a:p>
             <a:fld id="{4C707D6F-0D04-EC44-A702-F7C7F0C5C2B0}" type="datetimeFigureOut">
               <a:rPr lang="en-US" smtClean="0"/>
-              <a:t>10/29/17</a:t>
+              <a:t>10/31/17</a:t>
             </a:fld>
             <a:endParaRPr lang="en-US"/>
           </a:p>
@@ -2744,7 +2744,7 @@
           <a:p>
             <a:fld id="{4C707D6F-0D04-EC44-A702-F7C7F0C5C2B0}" type="datetimeFigureOut">
               <a:rPr lang="en-US" smtClean="0"/>
-              <a:t>10/29/17</a:t>
+              <a:t>10/31/17</a:t>
             </a:fld>
             <a:endParaRPr lang="en-US"/>
           </a:p>
@@ -2952,7 +2952,7 @@
           <a:p>
             <a:fld id="{4C707D6F-0D04-EC44-A702-F7C7F0C5C2B0}" type="datetimeFigureOut">
               <a:rPr lang="en-US" smtClean="0"/>
-              <a:t>10/29/17</a:t>
+              <a:t>10/31/17</a:t>
             </a:fld>
             <a:endParaRPr lang="en-US"/>
           </a:p>
@@ -4498,7 +4498,7 @@
         <p:spPr>
           <a:xfrm>
             <a:off x="474133" y="393564"/>
-            <a:ext cx="3153620" cy="369332"/>
+            <a:ext cx="3764557" cy="369332"/>
           </a:xfrm>
           <a:prstGeom prst="rect">
             <a:avLst/>
@@ -4525,14 +4525,18 @@
           <a:lstStyle/>
           <a:p>
             <a:r>
+              <a:rPr lang="en-US" smtClean="0"/>
+              <a:t>UML </a:t>
+            </a:r>
+            <a:r>
+              <a:rPr lang="en-US" smtClean="0"/>
+              <a:t>Class Diagram </a:t>
+            </a:r>
+            <a:r>
               <a:rPr lang="en-US" dirty="0" smtClean="0"/>
-              <a:t>UML </a:t>
-            </a:r>
-            <a:r>
-              <a:rPr lang="en-US" smtClean="0"/>
-              <a:t>Outline for Sort Command</a:t>
-            </a:r>
-            <a:endParaRPr lang="en-US"/>
+              <a:t>for Sort Command</a:t>
+            </a:r>
+            <a:endParaRPr lang="en-US" dirty="0"/>
           </a:p>
         </p:txBody>
       </p:sp>
@@ -5698,11 +5702,7 @@
             <a:pPr algn="ctr"/>
             <a:r>
               <a:rPr lang="en-US" sz="1000" dirty="0" smtClean="0"/>
-              <a:t>(“</a:t>
-            </a:r>
-            <a:r>
-              <a:rPr lang="en-US" sz="1000" dirty="0" smtClean="0"/>
-              <a:t>sort name </a:t>
+              <a:t>(“sort name </a:t>
             </a:r>
             <a:r>
               <a:rPr lang="en-US" sz="1000" dirty="0" err="1" smtClean="0"/>
@@ -5782,11 +5782,7 @@
             <a:pPr algn="ctr"/>
             <a:r>
               <a:rPr lang="en-US" sz="1000" dirty="0" smtClean="0"/>
-              <a:t>(</a:t>
-            </a:r>
-            <a:r>
-              <a:rPr lang="en-US" sz="1000" dirty="0" smtClean="0"/>
-              <a:t>field, order)</a:t>
+              <a:t>(field, order)</a:t>
             </a:r>
             <a:endParaRPr lang="en-US" sz="1000" dirty="0"/>
           </a:p>
@@ -6084,11 +6080,7 @@
             <a:pPr algn="ctr"/>
             <a:r>
               <a:rPr lang="en-US" sz="1000" dirty="0" smtClean="0"/>
-              <a:t>(“</a:t>
-            </a:r>
-            <a:r>
-              <a:rPr lang="en-US" sz="1000" dirty="0" smtClean="0"/>
-              <a:t>name”, “</a:t>
+              <a:t>(“name”, “</a:t>
             </a:r>
             <a:r>
               <a:rPr lang="en-US" sz="1000" dirty="0" err="1" smtClean="0"/>

</xml_diff>

<commit_message>
[SORT][DOCS] Saved updated sort command uml class diagrams
</commit_message>
<xml_diff>
--- a/docs/diagrams/SortCommandDiagrams.pptx
+++ b/docs/diagrams/SortCommandDiagrams.pptx
@@ -3404,7 +3404,7 @@
           <p:nvPr>
             <p:extLst>
               <p:ext uri="{D42A27DB-BD31-4B8C-83A1-F6EECF244321}">
-                <p14:modId xmlns:p14="http://schemas.microsoft.com/office/powerpoint/2010/main" val="1499011173"/>
+                <p14:modId xmlns:p14="http://schemas.microsoft.com/office/powerpoint/2010/main" val="549485447"/>
               </p:ext>
             </p:extLst>
           </p:nvPr>
@@ -3527,7 +3527,7 @@
           <p:nvPr>
             <p:extLst>
               <p:ext uri="{D42A27DB-BD31-4B8C-83A1-F6EECF244321}">
-                <p14:modId xmlns:p14="http://schemas.microsoft.com/office/powerpoint/2010/main" val="1750121654"/>
+                <p14:modId xmlns:p14="http://schemas.microsoft.com/office/powerpoint/2010/main" val="1022225629"/>
               </p:ext>
             </p:extLst>
           </p:nvPr>
@@ -3604,7 +3604,7 @@
           <p:nvPr>
             <p:extLst>
               <p:ext uri="{D42A27DB-BD31-4B8C-83A1-F6EECF244321}">
-                <p14:modId xmlns:p14="http://schemas.microsoft.com/office/powerpoint/2010/main" val="211125819"/>
+                <p14:modId xmlns:p14="http://schemas.microsoft.com/office/powerpoint/2010/main" val="676970603"/>
               </p:ext>
             </p:extLst>
           </p:nvPr>
@@ -3866,7 +3866,7 @@
           <p:nvPr>
             <p:extLst>
               <p:ext uri="{D42A27DB-BD31-4B8C-83A1-F6EECF244321}">
-                <p14:modId xmlns:p14="http://schemas.microsoft.com/office/powerpoint/2010/main" val="748655089"/>
+                <p14:modId xmlns:p14="http://schemas.microsoft.com/office/powerpoint/2010/main" val="476562815"/>
               </p:ext>
             </p:extLst>
           </p:nvPr>
@@ -4159,7 +4159,7 @@
           <p:nvPr>
             <p:extLst>
               <p:ext uri="{D42A27DB-BD31-4B8C-83A1-F6EECF244321}">
-                <p14:modId xmlns:p14="http://schemas.microsoft.com/office/powerpoint/2010/main" val="539393050"/>
+                <p14:modId xmlns:p14="http://schemas.microsoft.com/office/powerpoint/2010/main" val="1624712042"/>
               </p:ext>
             </p:extLst>
           </p:nvPr>
@@ -4241,7 +4241,7 @@
           <p:nvPr>
             <p:extLst>
               <p:ext uri="{D42A27DB-BD31-4B8C-83A1-F6EECF244321}">
-                <p14:modId xmlns:p14="http://schemas.microsoft.com/office/powerpoint/2010/main" val="1050517363"/>
+                <p14:modId xmlns:p14="http://schemas.microsoft.com/office/powerpoint/2010/main" val="1280718289"/>
               </p:ext>
             </p:extLst>
           </p:nvPr>
@@ -4525,11 +4525,11 @@
           <a:lstStyle/>
           <a:p>
             <a:r>
-              <a:rPr lang="en-US" smtClean="0"/>
+              <a:rPr lang="en-US" dirty="0" smtClean="0"/>
               <a:t>UML </a:t>
             </a:r>
             <a:r>
-              <a:rPr lang="en-US" smtClean="0"/>
+              <a:rPr lang="en-US" dirty="0" smtClean="0"/>
               <a:t>Class Diagram </a:t>
             </a:r>
             <a:r>

</xml_diff>

<commit_message>
[SORTCOMMAND][DEVDOCS] Updated developer docs for sort command
</commit_message>
<xml_diff>
--- a/docs/diagrams/SortCommandDiagrams.pptx
+++ b/docs/diagrams/SortCommandDiagrams.pptx
@@ -5,12 +5,13 @@
     <p:sldMasterId id="2147483672" r:id="rId1"/>
   </p:sldMasterIdLst>
   <p:notesMasterIdLst>
-    <p:notesMasterId r:id="rId5"/>
+    <p:notesMasterId r:id="rId6"/>
   </p:notesMasterIdLst>
   <p:sldIdLst>
     <p:sldId id="256" r:id="rId2"/>
-    <p:sldId id="258" r:id="rId3"/>
-    <p:sldId id="257" r:id="rId4"/>
+    <p:sldId id="259" r:id="rId3"/>
+    <p:sldId id="258" r:id="rId4"/>
+    <p:sldId id="257" r:id="rId5"/>
   </p:sldIdLst>
   <p:sldSz cx="12192000" cy="6858000"/>
   <p:notesSz cx="6858000" cy="9144000"/>
@@ -199,7 +200,7 @@
           <a:p>
             <a:fld id="{756A9B74-E80F-5C4E-A7DD-E49C20F7C5ED}" type="datetimeFigureOut">
               <a:rPr lang="en-US" smtClean="0"/>
-              <a:t>10/31/17</a:t>
+              <a:t>11/2/17</a:t>
             </a:fld>
             <a:endParaRPr lang="en-US"/>
           </a:p>
@@ -532,7 +533,7 @@
           <a:p>
             <a:fld id="{63641540-B136-3643-A0E1-762732219D5B}" type="slidenum">
               <a:rPr lang="en-US" smtClean="0"/>
-              <a:t>3</a:t>
+              <a:t>4</a:t>
             </a:fld>
             <a:endParaRPr lang="en-US"/>
           </a:p>
@@ -682,7 +683,7 @@
           <a:p>
             <a:fld id="{4C707D6F-0D04-EC44-A702-F7C7F0C5C2B0}" type="datetimeFigureOut">
               <a:rPr lang="en-US" smtClean="0"/>
-              <a:t>10/31/17</a:t>
+              <a:t>11/2/17</a:t>
             </a:fld>
             <a:endParaRPr lang="en-US"/>
           </a:p>
@@ -847,7 +848,7 @@
           <a:p>
             <a:fld id="{4C707D6F-0D04-EC44-A702-F7C7F0C5C2B0}" type="datetimeFigureOut">
               <a:rPr lang="en-US" smtClean="0"/>
-              <a:t>10/31/17</a:t>
+              <a:t>11/2/17</a:t>
             </a:fld>
             <a:endParaRPr lang="en-US"/>
           </a:p>
@@ -1022,7 +1023,7 @@
           <a:p>
             <a:fld id="{4C707D6F-0D04-EC44-A702-F7C7F0C5C2B0}" type="datetimeFigureOut">
               <a:rPr lang="en-US" smtClean="0"/>
-              <a:t>10/31/17</a:t>
+              <a:t>11/2/17</a:t>
             </a:fld>
             <a:endParaRPr lang="en-US"/>
           </a:p>
@@ -1187,7 +1188,7 @@
           <a:p>
             <a:fld id="{4C707D6F-0D04-EC44-A702-F7C7F0C5C2B0}" type="datetimeFigureOut">
               <a:rPr lang="en-US" smtClean="0"/>
-              <a:t>10/31/17</a:t>
+              <a:t>11/2/17</a:t>
             </a:fld>
             <a:endParaRPr lang="en-US"/>
           </a:p>
@@ -1428,7 +1429,7 @@
           <a:p>
             <a:fld id="{4C707D6F-0D04-EC44-A702-F7C7F0C5C2B0}" type="datetimeFigureOut">
               <a:rPr lang="en-US" smtClean="0"/>
-              <a:t>10/31/17</a:t>
+              <a:t>11/2/17</a:t>
             </a:fld>
             <a:endParaRPr lang="en-US"/>
           </a:p>
@@ -1655,7 +1656,7 @@
           <a:p>
             <a:fld id="{4C707D6F-0D04-EC44-A702-F7C7F0C5C2B0}" type="datetimeFigureOut">
               <a:rPr lang="en-US" smtClean="0"/>
-              <a:t>10/31/17</a:t>
+              <a:t>11/2/17</a:t>
             </a:fld>
             <a:endParaRPr lang="en-US"/>
           </a:p>
@@ -2017,7 +2018,7 @@
           <a:p>
             <a:fld id="{4C707D6F-0D04-EC44-A702-F7C7F0C5C2B0}" type="datetimeFigureOut">
               <a:rPr lang="en-US" smtClean="0"/>
-              <a:t>10/31/17</a:t>
+              <a:t>11/2/17</a:t>
             </a:fld>
             <a:endParaRPr lang="en-US"/>
           </a:p>
@@ -2130,7 +2131,7 @@
           <a:p>
             <a:fld id="{4C707D6F-0D04-EC44-A702-F7C7F0C5C2B0}" type="datetimeFigureOut">
               <a:rPr lang="en-US" smtClean="0"/>
-              <a:t>10/31/17</a:t>
+              <a:t>11/2/17</a:t>
             </a:fld>
             <a:endParaRPr lang="en-US"/>
           </a:p>
@@ -2220,7 +2221,7 @@
           <a:p>
             <a:fld id="{4C707D6F-0D04-EC44-A702-F7C7F0C5C2B0}" type="datetimeFigureOut">
               <a:rPr lang="en-US" smtClean="0"/>
-              <a:t>10/31/17</a:t>
+              <a:t>11/2/17</a:t>
             </a:fld>
             <a:endParaRPr lang="en-US"/>
           </a:p>
@@ -2492,7 +2493,7 @@
           <a:p>
             <a:fld id="{4C707D6F-0D04-EC44-A702-F7C7F0C5C2B0}" type="datetimeFigureOut">
               <a:rPr lang="en-US" smtClean="0"/>
-              <a:t>10/31/17</a:t>
+              <a:t>11/2/17</a:t>
             </a:fld>
             <a:endParaRPr lang="en-US"/>
           </a:p>
@@ -2744,7 +2745,7 @@
           <a:p>
             <a:fld id="{4C707D6F-0D04-EC44-A702-F7C7F0C5C2B0}" type="datetimeFigureOut">
               <a:rPr lang="en-US" smtClean="0"/>
-              <a:t>10/31/17</a:t>
+              <a:t>11/2/17</a:t>
             </a:fld>
             <a:endParaRPr lang="en-US"/>
           </a:p>
@@ -2952,7 +2953,7 @@
           <a:p>
             <a:fld id="{4C707D6F-0D04-EC44-A702-F7C7F0C5C2B0}" type="datetimeFigureOut">
               <a:rPr lang="en-US" smtClean="0"/>
-              <a:t>10/31/17</a:t>
+              <a:t>11/2/17</a:t>
             </a:fld>
             <a:endParaRPr lang="en-US"/>
           </a:p>
@@ -3404,14 +3405,14 @@
           <p:nvPr>
             <p:extLst>
               <p:ext uri="{D42A27DB-BD31-4B8C-83A1-F6EECF244321}">
-                <p14:modId xmlns:p14="http://schemas.microsoft.com/office/powerpoint/2010/main" val="549485447"/>
+                <p14:modId xmlns:p14="http://schemas.microsoft.com/office/powerpoint/2010/main" val="272656417"/>
               </p:ext>
             </p:extLst>
           </p:nvPr>
         </p:nvGraphicFramePr>
         <p:xfrm>
           <a:off x="4275945" y="1797630"/>
-          <a:ext cx="1668652" cy="1651000"/>
+          <a:ext cx="1668652" cy="1925320"/>
         </p:xfrm>
         <a:graphic>
           <a:graphicData uri="http://schemas.openxmlformats.org/drawingml/2006/table">
@@ -3451,7 +3452,26 @@
                       </a:pPr>
                       <a:r>
                         <a:rPr lang="en-US" dirty="0" smtClean="0"/>
-                        <a:t>- field:</a:t>
+                        <a:t>-</a:t>
+                      </a:r>
+                      <a:r>
+                        <a:rPr lang="en-US" baseline="0" dirty="0" smtClean="0"/>
+                        <a:t> listing: String</a:t>
+                      </a:r>
+                      <a:endParaRPr lang="en-US" dirty="0" smtClean="0"/>
+                    </a:p>
+                    <a:p>
+                      <a:pPr marL="0" indent="0" algn="just">
+                        <a:buFontTx/>
+                        <a:buNone/>
+                      </a:pPr>
+                      <a:r>
+                        <a:rPr lang="en-US" dirty="0" smtClean="0"/>
+                        <a:t>- </a:t>
+                      </a:r>
+                      <a:r>
+                        <a:rPr lang="en-US" dirty="0" smtClean="0"/>
+                        <a:t>field:</a:t>
                       </a:r>
                       <a:r>
                         <a:rPr lang="en-US" baseline="0" dirty="0" smtClean="0"/>
@@ -3604,14 +3624,14 @@
           <p:nvPr>
             <p:extLst>
               <p:ext uri="{D42A27DB-BD31-4B8C-83A1-F6EECF244321}">
-                <p14:modId xmlns:p14="http://schemas.microsoft.com/office/powerpoint/2010/main" val="676970603"/>
+                <p14:modId xmlns:p14="http://schemas.microsoft.com/office/powerpoint/2010/main" val="818098485"/>
               </p:ext>
             </p:extLst>
           </p:nvPr>
         </p:nvGraphicFramePr>
         <p:xfrm>
           <a:off x="6641965" y="1137541"/>
-          <a:ext cx="4462204" cy="2733154"/>
+          <a:ext cx="4462204" cy="2489314"/>
         </p:xfrm>
         <a:graphic>
           <a:graphicData uri="http://schemas.openxmlformats.org/drawingml/2006/table">
@@ -3693,7 +3713,7 @@
                       </a:r>
                       <a:r>
                         <a:rPr lang="en-US" sz="1600" baseline="0" dirty="0" err="1" smtClean="0"/>
-                        <a:t>UniqueTasksList</a:t>
+                        <a:t>UniqueTaskList</a:t>
                       </a:r>
                       <a:endParaRPr lang="en-US" sz="1600" dirty="0"/>
                     </a:p>
@@ -3768,47 +3788,20 @@
                       </a:r>
                       <a:r>
                         <a:rPr lang="en-US" sz="1600" dirty="0" smtClean="0"/>
-                        <a:t>(Set&lt;Tag&gt; tags)</a:t>
+                        <a:t>(Set&lt;Tag&gt; tags</a:t>
+                      </a:r>
+                      <a:r>
+                        <a:rPr lang="en-US" sz="1600" dirty="0" smtClean="0"/>
+                        <a:t>)</a:t>
                       </a:r>
                     </a:p>
                     <a:p>
                       <a:pPr algn="just"/>
                       <a:r>
-                        <a:rPr lang="en-US" sz="1600" dirty="0" smtClean="0"/>
-                        <a:t>+ </a:t>
-                      </a:r>
-                      <a:r>
-                        <a:rPr lang="en-US" sz="1600" kern="1200" dirty="0" err="1" smtClean="0">
-                          <a:solidFill>
-                            <a:schemeClr val="dk1"/>
-                          </a:solidFill>
-                          <a:effectLst/>
-                          <a:latin typeface="+mn-lt"/>
-                          <a:ea typeface="+mn-ea"/>
-                          <a:cs typeface="+mn-cs"/>
-                        </a:rPr>
-                        <a:t>resetData</a:t>
-                      </a:r>
-                      <a:r>
-                        <a:rPr lang="en-US" sz="1600" dirty="0" smtClean="0"/>
-                        <a:t>(</a:t>
-                      </a:r>
-                      <a:r>
-                        <a:rPr lang="en-US" sz="1600" dirty="0" err="1" smtClean="0"/>
-                        <a:t>ReadOnlyAddressBook</a:t>
-                      </a:r>
-                      <a:r>
-                        <a:rPr lang="en-US" sz="1600" dirty="0" smtClean="0"/>
-                        <a:t> </a:t>
-                      </a:r>
-                      <a:r>
-                        <a:rPr lang="en-US" sz="1600" dirty="0" err="1" smtClean="0"/>
-                        <a:t>newData</a:t>
-                      </a:r>
-                      <a:r>
-                        <a:rPr lang="en-US" sz="1600" dirty="0" smtClean="0"/>
-                        <a:t>)</a:t>
-                      </a:r>
+                        <a:rPr lang="mr-IN" sz="1600" dirty="0" smtClean="0"/>
+                        <a:t>…</a:t>
+                      </a:r>
+                      <a:endParaRPr lang="en-US" sz="1600" dirty="0" smtClean="0"/>
                     </a:p>
                     <a:p>
                       <a:pPr algn="just"/>
@@ -3817,35 +3810,12 @@
                         <a:t>+ </a:t>
                       </a:r>
                       <a:r>
-                        <a:rPr lang="en-US" sz="1600" kern="1200" dirty="0" err="1" smtClean="0">
-                          <a:solidFill>
-                            <a:schemeClr val="dk1"/>
-                          </a:solidFill>
-                          <a:effectLst/>
-                          <a:latin typeface="+mn-lt"/>
-                          <a:ea typeface="+mn-ea"/>
-                          <a:cs typeface="+mn-cs"/>
-                        </a:rPr>
-                        <a:t>addPerson</a:t>
+                        <a:rPr lang="en-US" sz="1600" dirty="0" err="1" smtClean="0"/>
+                        <a:t>sortBy</a:t>
                       </a:r>
                       <a:r>
                         <a:rPr lang="en-US" sz="1600" dirty="0" smtClean="0"/>
-                        <a:t>(</a:t>
-                      </a:r>
-                      <a:r>
-                        <a:rPr lang="en-US" sz="1600" dirty="0" err="1" smtClean="0"/>
-                        <a:t>ReadOnlyPerson</a:t>
-                      </a:r>
-                      <a:r>
-                        <a:rPr lang="en-US" sz="1600" dirty="0" smtClean="0"/>
-                        <a:t> p)</a:t>
-                      </a:r>
-                    </a:p>
-                    <a:p>
-                      <a:pPr algn="just"/>
-                      <a:r>
-                        <a:rPr lang="mr-IN" sz="1600" dirty="0" smtClean="0"/>
-                        <a:t>…</a:t>
+                        <a:t>(String field, String order)</a:t>
                       </a:r>
                       <a:endParaRPr lang="en-US" sz="1600" dirty="0"/>
                     </a:p>
@@ -4394,8 +4364,8 @@
         </p:nvCxnSpPr>
         <p:spPr>
           <a:xfrm flipV="1">
-            <a:off x="3596101" y="2623130"/>
-            <a:ext cx="679844" cy="1922837"/>
+            <a:off x="3596101" y="2760290"/>
+            <a:ext cx="679844" cy="1785678"/>
           </a:xfrm>
           <a:prstGeom prst="straightConnector1">
             <a:avLst/>
@@ -4429,8 +4399,8 @@
         </p:nvCxnSpPr>
         <p:spPr>
           <a:xfrm flipV="1">
-            <a:off x="5944597" y="2504118"/>
-            <a:ext cx="697368" cy="346342"/>
+            <a:off x="5944597" y="2382198"/>
+            <a:ext cx="697368" cy="468262"/>
           </a:xfrm>
           <a:prstGeom prst="straightConnector1">
             <a:avLst/>
@@ -4458,14 +4428,15 @@
         <p:nvCxnSpPr>
           <p:cNvPr id="33" name="Straight Arrow Connector 32"/>
           <p:cNvCxnSpPr>
+            <a:stCxn id="19" idx="2"/>
             <a:endCxn id="20" idx="0"/>
           </p:cNvCxnSpPr>
           <p:nvPr/>
         </p:nvCxnSpPr>
         <p:spPr>
           <a:xfrm flipH="1">
-            <a:off x="7425545" y="3849740"/>
-            <a:ext cx="1368500" cy="325387"/>
+            <a:off x="7425545" y="3626855"/>
+            <a:ext cx="1447522" cy="548272"/>
           </a:xfrm>
           <a:prstGeom prst="straightConnector1">
             <a:avLst/>
@@ -4498,7 +4469,7 @@
         <p:spPr>
           <a:xfrm>
             <a:off x="474133" y="393564"/>
-            <a:ext cx="3764557" cy="369332"/>
+            <a:ext cx="4402667" cy="369332"/>
           </a:xfrm>
           <a:prstGeom prst="rect">
             <a:avLst/>
@@ -4519,22 +4490,18 @@
           </a:fontRef>
         </p:style>
         <p:txBody>
-          <a:bodyPr wrap="none" rtlCol="0">
+          <a:bodyPr wrap="square" rtlCol="0">
             <a:spAutoFit/>
           </a:bodyPr>
           <a:lstStyle/>
           <a:p>
             <a:r>
               <a:rPr lang="en-US" dirty="0" smtClean="0"/>
-              <a:t>UML </a:t>
+              <a:t>UML Class Diagram for </a:t>
             </a:r>
             <a:r>
               <a:rPr lang="en-US" dirty="0" smtClean="0"/>
-              <a:t>Class Diagram </a:t>
-            </a:r>
-            <a:r>
-              <a:rPr lang="en-US" dirty="0" smtClean="0"/>
-              <a:t>for Sort Command</a:t>
+              <a:t>Sorting Persons</a:t>
             </a:r>
             <a:endParaRPr lang="en-US" dirty="0"/>
           </a:p>
@@ -4579,6 +4546,1167 @@
       </p:grpSpPr>
       <p:sp>
         <p:nvSpPr>
+          <p:cNvPr id="34" name="Rectangle 33"/>
+          <p:cNvSpPr/>
+          <p:nvPr/>
+        </p:nvSpPr>
+        <p:spPr>
+          <a:xfrm>
+            <a:off x="474133" y="395111"/>
+            <a:ext cx="10905067" cy="6197600"/>
+          </a:xfrm>
+          <a:prstGeom prst="rect">
+            <a:avLst/>
+          </a:prstGeom>
+        </p:spPr>
+        <p:style>
+          <a:lnRef idx="2">
+            <a:schemeClr val="dk1"/>
+          </a:lnRef>
+          <a:fillRef idx="1">
+            <a:schemeClr val="lt1"/>
+          </a:fillRef>
+          <a:effectRef idx="0">
+            <a:schemeClr val="dk1"/>
+          </a:effectRef>
+          <a:fontRef idx="minor">
+            <a:schemeClr val="dk1"/>
+          </a:fontRef>
+        </p:style>
+        <p:txBody>
+          <a:bodyPr rtlCol="0" anchor="ctr"/>
+          <a:lstStyle/>
+          <a:p>
+            <a:pPr algn="ctr"/>
+            <a:endParaRPr lang="en-US"/>
+          </a:p>
+        </p:txBody>
+      </p:sp>
+      <p:graphicFrame>
+        <p:nvGraphicFramePr>
+          <p:cNvPr id="16" name="Table 15"/>
+          <p:cNvGraphicFramePr>
+            <a:graphicFrameLocks noGrp="1"/>
+          </p:cNvGraphicFramePr>
+          <p:nvPr>
+            <p:extLst>
+              <p:ext uri="{D42A27DB-BD31-4B8C-83A1-F6EECF244321}">
+                <p14:modId xmlns:p14="http://schemas.microsoft.com/office/powerpoint/2010/main" val="335908345"/>
+              </p:ext>
+            </p:extLst>
+          </p:nvPr>
+        </p:nvGraphicFramePr>
+        <p:xfrm>
+          <a:off x="4275945" y="1797630"/>
+          <a:ext cx="1668652" cy="1925320"/>
+        </p:xfrm>
+        <a:graphic>
+          <a:graphicData uri="http://schemas.openxmlformats.org/drawingml/2006/table">
+            <a:tbl>
+              <a:tblPr firstRow="1" bandRow="1">
+                <a:tableStyleId>{93296810-A885-4BE3-A3E7-6D5BEEA58F35}</a:tableStyleId>
+              </a:tblPr>
+              <a:tblGrid>
+                <a:gridCol w="1668652"/>
+              </a:tblGrid>
+              <a:tr h="370840">
+                <a:tc>
+                  <a:txBody>
+                    <a:bodyPr/>
+                    <a:lstStyle/>
+                    <a:p>
+                      <a:pPr algn="just"/>
+                      <a:r>
+                        <a:rPr lang="en-US" dirty="0" err="1" smtClean="0"/>
+                        <a:t>SortCommand</a:t>
+                      </a:r>
+                      <a:endParaRPr lang="en-US" dirty="0"/>
+                    </a:p>
+                  </a:txBody>
+                  <a:tcPr/>
+                </a:tc>
+              </a:tr>
+              <a:tr h="370840">
+                <a:tc>
+                  <a:txBody>
+                    <a:bodyPr/>
+                    <a:lstStyle/>
+                    <a:p>
+                      <a:pPr marL="0" indent="0" algn="just">
+                        <a:buFontTx/>
+                        <a:buNone/>
+                      </a:pPr>
+                      <a:r>
+                        <a:rPr lang="en-US" dirty="0" smtClean="0"/>
+                        <a:t>-</a:t>
+                      </a:r>
+                      <a:r>
+                        <a:rPr lang="en-US" baseline="0" dirty="0" smtClean="0"/>
+                        <a:t> listing: String</a:t>
+                      </a:r>
+                      <a:endParaRPr lang="en-US" dirty="0" smtClean="0"/>
+                    </a:p>
+                    <a:p>
+                      <a:pPr marL="0" indent="0" algn="just">
+                        <a:buFontTx/>
+                        <a:buNone/>
+                      </a:pPr>
+                      <a:r>
+                        <a:rPr lang="en-US" dirty="0" smtClean="0"/>
+                        <a:t>- </a:t>
+                      </a:r>
+                      <a:r>
+                        <a:rPr lang="en-US" dirty="0" smtClean="0"/>
+                        <a:t>field:</a:t>
+                      </a:r>
+                      <a:r>
+                        <a:rPr lang="en-US" baseline="0" dirty="0" smtClean="0"/>
+                        <a:t> String</a:t>
+                      </a:r>
+                      <a:endParaRPr lang="en-US" dirty="0" smtClean="0"/>
+                    </a:p>
+                    <a:p>
+                      <a:pPr marL="0" indent="0" algn="just">
+                        <a:buFontTx/>
+                        <a:buNone/>
+                      </a:pPr>
+                      <a:r>
+                        <a:rPr lang="en-US" dirty="0" smtClean="0"/>
+                        <a:t>- order: String</a:t>
+                      </a:r>
+                      <a:endParaRPr lang="en-US" dirty="0"/>
+                    </a:p>
+                  </a:txBody>
+                  <a:tcPr/>
+                </a:tc>
+              </a:tr>
+              <a:tr h="370840">
+                <a:tc>
+                  <a:txBody>
+                    <a:bodyPr/>
+                    <a:lstStyle/>
+                    <a:p>
+                      <a:pPr algn="just"/>
+                      <a:r>
+                        <a:rPr lang="en-US" dirty="0" smtClean="0"/>
+                        <a:t>+ </a:t>
+                      </a:r>
+                      <a:r>
+                        <a:rPr lang="en-US" dirty="0" err="1" smtClean="0"/>
+                        <a:t>getField</a:t>
+                      </a:r>
+                      <a:r>
+                        <a:rPr lang="en-US" dirty="0" smtClean="0"/>
+                        <a:t>()</a:t>
+                      </a:r>
+                    </a:p>
+                    <a:p>
+                      <a:pPr algn="just"/>
+                      <a:r>
+                        <a:rPr lang="en-US" dirty="0" smtClean="0"/>
+                        <a:t>+ </a:t>
+                      </a:r>
+                      <a:r>
+                        <a:rPr lang="en-US" dirty="0" err="1" smtClean="0"/>
+                        <a:t>getOrder</a:t>
+                      </a:r>
+                      <a:r>
+                        <a:rPr lang="en-US" dirty="0" smtClean="0"/>
+                        <a:t>()</a:t>
+                      </a:r>
+                      <a:endParaRPr lang="en-US" dirty="0"/>
+                    </a:p>
+                  </a:txBody>
+                  <a:tcPr/>
+                </a:tc>
+              </a:tr>
+            </a:tbl>
+          </a:graphicData>
+        </a:graphic>
+      </p:graphicFrame>
+      <p:graphicFrame>
+        <p:nvGraphicFramePr>
+          <p:cNvPr id="18" name="Table 17"/>
+          <p:cNvGraphicFramePr>
+            <a:graphicFrameLocks noGrp="1"/>
+          </p:cNvGraphicFramePr>
+          <p:nvPr>
+            <p:extLst>
+              <p:ext uri="{D42A27DB-BD31-4B8C-83A1-F6EECF244321}">
+                <p14:modId xmlns:p14="http://schemas.microsoft.com/office/powerpoint/2010/main" val="2123865597"/>
+              </p:ext>
+            </p:extLst>
+          </p:nvPr>
+        </p:nvGraphicFramePr>
+        <p:xfrm>
+          <a:off x="1312031" y="4175127"/>
+          <a:ext cx="2284070" cy="741680"/>
+        </p:xfrm>
+        <a:graphic>
+          <a:graphicData uri="http://schemas.openxmlformats.org/drawingml/2006/table">
+            <a:tbl>
+              <a:tblPr firstRow="1" bandRow="1">
+                <a:tableStyleId>{93296810-A885-4BE3-A3E7-6D5BEEA58F35}</a:tableStyleId>
+              </a:tblPr>
+              <a:tblGrid>
+                <a:gridCol w="2284070"/>
+              </a:tblGrid>
+              <a:tr h="370840">
+                <a:tc>
+                  <a:txBody>
+                    <a:bodyPr/>
+                    <a:lstStyle/>
+                    <a:p>
+                      <a:pPr algn="just"/>
+                      <a:r>
+                        <a:rPr lang="en-US" sz="1600" dirty="0" err="1" smtClean="0"/>
+                        <a:t>SortCommandParser</a:t>
+                      </a:r>
+                      <a:endParaRPr lang="en-US" sz="1600" dirty="0"/>
+                    </a:p>
+                  </a:txBody>
+                  <a:tcPr/>
+                </a:tc>
+              </a:tr>
+              <a:tr h="370840">
+                <a:tc>
+                  <a:txBody>
+                    <a:bodyPr/>
+                    <a:lstStyle/>
+                    <a:p>
+                      <a:pPr algn="just"/>
+                      <a:r>
+                        <a:rPr lang="en-US" dirty="0" smtClean="0"/>
+                        <a:t>+ parse(String</a:t>
+                      </a:r>
+                      <a:r>
+                        <a:rPr lang="en-US" baseline="0" dirty="0" smtClean="0"/>
+                        <a:t> </a:t>
+                      </a:r>
+                      <a:r>
+                        <a:rPr lang="en-US" baseline="0" dirty="0" err="1" smtClean="0"/>
+                        <a:t>args</a:t>
+                      </a:r>
+                      <a:r>
+                        <a:rPr lang="en-US" baseline="0" dirty="0" smtClean="0"/>
+                        <a:t>)</a:t>
+                      </a:r>
+                      <a:endParaRPr lang="en-US" dirty="0"/>
+                    </a:p>
+                  </a:txBody>
+                  <a:tcPr/>
+                </a:tc>
+              </a:tr>
+            </a:tbl>
+          </a:graphicData>
+        </a:graphic>
+      </p:graphicFrame>
+      <p:graphicFrame>
+        <p:nvGraphicFramePr>
+          <p:cNvPr id="19" name="Table 18"/>
+          <p:cNvGraphicFramePr>
+            <a:graphicFrameLocks noGrp="1"/>
+          </p:cNvGraphicFramePr>
+          <p:nvPr>
+            <p:extLst>
+              <p:ext uri="{D42A27DB-BD31-4B8C-83A1-F6EECF244321}">
+                <p14:modId xmlns:p14="http://schemas.microsoft.com/office/powerpoint/2010/main" val="837359018"/>
+              </p:ext>
+            </p:extLst>
+          </p:nvPr>
+        </p:nvGraphicFramePr>
+        <p:xfrm>
+          <a:off x="6641965" y="1137541"/>
+          <a:ext cx="4462204" cy="2489314"/>
+        </p:xfrm>
+        <a:graphic>
+          <a:graphicData uri="http://schemas.openxmlformats.org/drawingml/2006/table">
+            <a:tbl>
+              <a:tblPr firstRow="1" bandRow="1">
+                <a:tableStyleId>{93296810-A885-4BE3-A3E7-6D5BEEA58F35}</a:tableStyleId>
+              </a:tblPr>
+              <a:tblGrid>
+                <a:gridCol w="4462204"/>
+              </a:tblGrid>
+              <a:tr h="355714">
+                <a:tc>
+                  <a:txBody>
+                    <a:bodyPr/>
+                    <a:lstStyle/>
+                    <a:p>
+                      <a:pPr algn="just"/>
+                      <a:r>
+                        <a:rPr lang="en-US" sz="1600" dirty="0" err="1" smtClean="0"/>
+                        <a:t>AddressBook</a:t>
+                      </a:r>
+                      <a:endParaRPr lang="en-US" sz="1600" dirty="0"/>
+                    </a:p>
+                  </a:txBody>
+                  <a:tcPr/>
+                </a:tc>
+              </a:tr>
+              <a:tr h="370840">
+                <a:tc>
+                  <a:txBody>
+                    <a:bodyPr/>
+                    <a:lstStyle/>
+                    <a:p>
+                      <a:pPr marL="0" indent="0" algn="just">
+                        <a:buFontTx/>
+                        <a:buNone/>
+                      </a:pPr>
+                      <a:r>
+                        <a:rPr lang="en-US" sz="1600" dirty="0" smtClean="0"/>
+                        <a:t>- persons: </a:t>
+                      </a:r>
+                      <a:r>
+                        <a:rPr lang="en-US" sz="1600" dirty="0" err="1" smtClean="0"/>
+                        <a:t>UniquePersonList</a:t>
+                      </a:r>
+                      <a:endParaRPr lang="en-US" sz="1600" dirty="0" smtClean="0"/>
+                    </a:p>
+                    <a:p>
+                      <a:pPr marL="0" indent="0" algn="just">
+                        <a:buFontTx/>
+                        <a:buNone/>
+                      </a:pPr>
+                      <a:r>
+                        <a:rPr lang="en-US" sz="1600" dirty="0" smtClean="0"/>
+                        <a:t>- tags:</a:t>
+                      </a:r>
+                      <a:r>
+                        <a:rPr lang="en-US" sz="1600" baseline="0" dirty="0" smtClean="0"/>
+                        <a:t> </a:t>
+                      </a:r>
+                      <a:r>
+                        <a:rPr lang="en-US" sz="1600" baseline="0" dirty="0" err="1" smtClean="0"/>
+                        <a:t>UniqueTagList</a:t>
+                      </a:r>
+                      <a:endParaRPr lang="en-US" sz="1600" baseline="0" dirty="0" smtClean="0"/>
+                    </a:p>
+                    <a:p>
+                      <a:pPr marL="0" indent="0" algn="just">
+                        <a:buFontTx/>
+                        <a:buNone/>
+                      </a:pPr>
+                      <a:r>
+                        <a:rPr lang="en-US" sz="1600" dirty="0" smtClean="0"/>
+                        <a:t>- tasks:</a:t>
+                      </a:r>
+                      <a:r>
+                        <a:rPr lang="en-US" sz="1600" baseline="0" dirty="0" smtClean="0"/>
+                        <a:t> </a:t>
+                      </a:r>
+                      <a:r>
+                        <a:rPr lang="en-US" sz="1600" baseline="0" dirty="0" err="1" smtClean="0"/>
+                        <a:t>UniqueTaskList</a:t>
+                      </a:r>
+                      <a:endParaRPr lang="en-US" sz="1600" dirty="0"/>
+                    </a:p>
+                  </a:txBody>
+                  <a:tcPr/>
+                </a:tc>
+              </a:tr>
+              <a:tr h="370840">
+                <a:tc>
+                  <a:txBody>
+                    <a:bodyPr/>
+                    <a:lstStyle/>
+                    <a:p>
+                      <a:pPr algn="just"/>
+                      <a:r>
+                        <a:rPr lang="en-US" sz="1600" dirty="0" smtClean="0"/>
+                        <a:t>+ parse(String</a:t>
+                      </a:r>
+                      <a:r>
+                        <a:rPr lang="en-US" sz="1600" baseline="0" dirty="0" smtClean="0"/>
+                        <a:t> </a:t>
+                      </a:r>
+                      <a:r>
+                        <a:rPr lang="en-US" sz="1600" baseline="0" dirty="0" err="1" smtClean="0"/>
+                        <a:t>args</a:t>
+                      </a:r>
+                      <a:r>
+                        <a:rPr lang="en-US" sz="1600" baseline="0" dirty="0" smtClean="0"/>
+                        <a:t>)</a:t>
+                      </a:r>
+                    </a:p>
+                    <a:p>
+                      <a:pPr algn="just"/>
+                      <a:r>
+                        <a:rPr lang="en-US" sz="1600" baseline="0" dirty="0" smtClean="0"/>
+                        <a:t>+ </a:t>
+                      </a:r>
+                      <a:r>
+                        <a:rPr lang="en-US" sz="1600" baseline="0" dirty="0" err="1" smtClean="0"/>
+                        <a:t>setPersons</a:t>
+                      </a:r>
+                      <a:r>
+                        <a:rPr lang="en-US" sz="1600" baseline="0" dirty="0" smtClean="0"/>
+                        <a:t>(List&lt;</a:t>
+                      </a:r>
+                      <a:r>
+                        <a:rPr lang="en-US" sz="1600" baseline="0" dirty="0" err="1" smtClean="0"/>
+                        <a:t>ReadOnlyTask</a:t>
+                      </a:r>
+                      <a:r>
+                        <a:rPr lang="en-US" sz="1600" baseline="0" dirty="0" smtClean="0"/>
+                        <a:t>&gt; </a:t>
+                      </a:r>
+                      <a:r>
+                        <a:rPr lang="en-US" sz="1600" baseline="0" dirty="0" smtClean="0"/>
+                        <a:t>persons)</a:t>
+                      </a:r>
+                    </a:p>
+                    <a:p>
+                      <a:pPr algn="just"/>
+                      <a:r>
+                        <a:rPr lang="en-US" sz="1600" baseline="0" dirty="0" smtClean="0"/>
+                        <a:t>+ </a:t>
+                      </a:r>
+                      <a:r>
+                        <a:rPr lang="en-US" sz="1600" kern="1200" dirty="0" err="1" smtClean="0">
+                          <a:effectLst/>
+                        </a:rPr>
+                        <a:t>setTags</a:t>
+                      </a:r>
+                      <a:r>
+                        <a:rPr lang="en-US" sz="1600" dirty="0" smtClean="0"/>
+                        <a:t>(Set&lt;Tag&gt; tags</a:t>
+                      </a:r>
+                      <a:r>
+                        <a:rPr lang="en-US" sz="1600" dirty="0" smtClean="0"/>
+                        <a:t>)</a:t>
+                      </a:r>
+                    </a:p>
+                    <a:p>
+                      <a:pPr algn="just"/>
+                      <a:r>
+                        <a:rPr lang="mr-IN" sz="1600" dirty="0" smtClean="0"/>
+                        <a:t>…</a:t>
+                      </a:r>
+                      <a:endParaRPr lang="en-US" sz="1600" dirty="0" smtClean="0"/>
+                    </a:p>
+                    <a:p>
+                      <a:pPr algn="just"/>
+                      <a:r>
+                        <a:rPr lang="en-US" sz="1600" dirty="0" smtClean="0"/>
+                        <a:t>+ </a:t>
+                      </a:r>
+                      <a:r>
+                        <a:rPr lang="en-US" sz="1600" dirty="0" err="1" smtClean="0"/>
+                        <a:t>sortBy</a:t>
+                      </a:r>
+                      <a:r>
+                        <a:rPr lang="en-US" sz="1600" dirty="0" smtClean="0"/>
+                        <a:t>(String field, String order)</a:t>
+                      </a:r>
+                      <a:endParaRPr lang="en-US" sz="1600" dirty="0"/>
+                    </a:p>
+                  </a:txBody>
+                  <a:tcPr/>
+                </a:tc>
+              </a:tr>
+            </a:tbl>
+          </a:graphicData>
+        </a:graphic>
+      </p:graphicFrame>
+      <p:graphicFrame>
+        <p:nvGraphicFramePr>
+          <p:cNvPr id="20" name="Table 19"/>
+          <p:cNvGraphicFramePr>
+            <a:graphicFrameLocks noGrp="1"/>
+          </p:cNvGraphicFramePr>
+          <p:nvPr>
+            <p:extLst>
+              <p:ext uri="{D42A27DB-BD31-4B8C-83A1-F6EECF244321}">
+                <p14:modId xmlns:p14="http://schemas.microsoft.com/office/powerpoint/2010/main" val="120367043"/>
+              </p:ext>
+            </p:extLst>
+          </p:nvPr>
+        </p:nvGraphicFramePr>
+        <p:xfrm>
+          <a:off x="4275945" y="4175127"/>
+          <a:ext cx="6299200" cy="2260600"/>
+        </p:xfrm>
+        <a:graphic>
+          <a:graphicData uri="http://schemas.openxmlformats.org/drawingml/2006/table">
+            <a:tbl>
+              <a:tblPr firstRow="1" bandRow="1">
+                <a:tableStyleId>{93296810-A885-4BE3-A3E7-6D5BEEA58F35}</a:tableStyleId>
+              </a:tblPr>
+              <a:tblGrid>
+                <a:gridCol w="6299200"/>
+              </a:tblGrid>
+              <a:tr h="370840">
+                <a:tc>
+                  <a:txBody>
+                    <a:bodyPr/>
+                    <a:lstStyle/>
+                    <a:p>
+                      <a:pPr algn="just"/>
+                      <a:r>
+                        <a:rPr lang="en-US" sz="1600" dirty="0" err="1" smtClean="0"/>
+                        <a:t>UniqueTaskList</a:t>
+                      </a:r>
+                      <a:endParaRPr lang="en-US" sz="1600" dirty="0"/>
+                    </a:p>
+                  </a:txBody>
+                  <a:tcPr/>
+                </a:tc>
+              </a:tr>
+              <a:tr h="370840">
+                <a:tc>
+                  <a:txBody>
+                    <a:bodyPr/>
+                    <a:lstStyle/>
+                    <a:p>
+                      <a:pPr marL="0" indent="0" algn="just">
+                        <a:buFontTx/>
+                        <a:buNone/>
+                      </a:pPr>
+                      <a:r>
+                        <a:rPr lang="en-US" sz="1600" dirty="0" smtClean="0"/>
+                        <a:t>- </a:t>
+                      </a:r>
+                      <a:r>
+                        <a:rPr lang="en-US" sz="1600" dirty="0" err="1" smtClean="0"/>
+                        <a:t>internalList</a:t>
+                      </a:r>
+                      <a:r>
+                        <a:rPr lang="en-US" sz="1600" baseline="0" dirty="0" smtClean="0"/>
+                        <a:t>: </a:t>
+                      </a:r>
+                      <a:r>
+                        <a:rPr lang="en-US" sz="1600" baseline="0" dirty="0" err="1" smtClean="0"/>
+                        <a:t>ObservableList</a:t>
+                      </a:r>
+                      <a:r>
+                        <a:rPr lang="en-US" sz="1600" baseline="0" dirty="0" smtClean="0"/>
+                        <a:t>&lt;Task&gt;</a:t>
+                      </a:r>
+                      <a:endParaRPr lang="en-US" sz="1600" dirty="0" smtClean="0"/>
+                    </a:p>
+                    <a:p>
+                      <a:pPr marL="0" indent="0" algn="just">
+                        <a:buFontTx/>
+                        <a:buNone/>
+                      </a:pPr>
+                      <a:r>
+                        <a:rPr lang="en-US" sz="1600" dirty="0" smtClean="0"/>
+                        <a:t>- </a:t>
+                      </a:r>
+                      <a:r>
+                        <a:rPr lang="en-US" sz="1600" dirty="0" err="1" smtClean="0"/>
+                        <a:t>mappedList</a:t>
+                      </a:r>
+                      <a:r>
+                        <a:rPr lang="en-US" sz="1600" dirty="0" smtClean="0"/>
+                        <a:t>: </a:t>
+                      </a:r>
+                      <a:r>
+                        <a:rPr lang="en-US" sz="1600" dirty="0" err="1" smtClean="0"/>
+                        <a:t>ObservableList</a:t>
+                      </a:r>
+                      <a:r>
+                        <a:rPr lang="en-US" sz="1600" dirty="0" smtClean="0"/>
+                        <a:t>&lt;</a:t>
+                      </a:r>
+                      <a:r>
+                        <a:rPr lang="en-US" sz="1600" dirty="0" err="1" smtClean="0"/>
+                        <a:t>ReadOnlyTask</a:t>
+                      </a:r>
+                      <a:r>
+                        <a:rPr lang="en-US" sz="1600" dirty="0" smtClean="0"/>
+                        <a:t>&gt;</a:t>
+                      </a:r>
+                      <a:endParaRPr lang="en-US" sz="1600" baseline="0" dirty="0" smtClean="0"/>
+                    </a:p>
+                    <a:p>
+                      <a:pPr marL="0" indent="0" algn="just">
+                        <a:buFontTx/>
+                        <a:buNone/>
+                      </a:pPr>
+                      <a:r>
+                        <a:rPr lang="en-US" sz="1600" dirty="0" smtClean="0"/>
+                        <a:t>- tasks:</a:t>
+                      </a:r>
+                      <a:r>
+                        <a:rPr lang="en-US" sz="1600" baseline="0" dirty="0" smtClean="0"/>
+                        <a:t> </a:t>
+                      </a:r>
+                      <a:r>
+                        <a:rPr lang="en-US" sz="1600" baseline="0" dirty="0" err="1" smtClean="0"/>
+                        <a:t>UniqueTaskList</a:t>
+                      </a:r>
+                      <a:endParaRPr lang="en-US" sz="1600" dirty="0"/>
+                    </a:p>
+                  </a:txBody>
+                  <a:tcPr/>
+                </a:tc>
+              </a:tr>
+              <a:tr h="370840">
+                <a:tc>
+                  <a:txBody>
+                    <a:bodyPr/>
+                    <a:lstStyle/>
+                    <a:p>
+                      <a:pPr algn="just"/>
+                      <a:r>
+                        <a:rPr lang="en-US" sz="1600" dirty="0" smtClean="0"/>
+                        <a:t>+ </a:t>
+                      </a:r>
+                      <a:r>
+                        <a:rPr lang="en-US" sz="1600" kern="1200" dirty="0" smtClean="0">
+                          <a:effectLst/>
+                        </a:rPr>
+                        <a:t>contains</a:t>
+                      </a:r>
+                      <a:r>
+                        <a:rPr lang="en-US" sz="1600" dirty="0" smtClean="0"/>
+                        <a:t>(</a:t>
+                      </a:r>
+                      <a:r>
+                        <a:rPr lang="en-US" sz="1600" dirty="0" err="1" smtClean="0"/>
+                        <a:t>ReadOnlyTask</a:t>
+                      </a:r>
+                      <a:r>
+                        <a:rPr lang="en-US" sz="1600" dirty="0" smtClean="0"/>
+                        <a:t> </a:t>
+                      </a:r>
+                      <a:r>
+                        <a:rPr lang="en-US" sz="1600" dirty="0" err="1" smtClean="0"/>
+                        <a:t>toCheck</a:t>
+                      </a:r>
+                      <a:r>
+                        <a:rPr lang="en-US" sz="1600" dirty="0" smtClean="0"/>
+                        <a:t>)</a:t>
+                      </a:r>
+                    </a:p>
+                    <a:p>
+                      <a:pPr algn="just"/>
+                      <a:r>
+                        <a:rPr lang="en-US" sz="1600" baseline="0" dirty="0" smtClean="0"/>
+                        <a:t>+ </a:t>
+                      </a:r>
+                      <a:r>
+                        <a:rPr lang="en-US" sz="1600" kern="1200" dirty="0" smtClean="0">
+                          <a:effectLst/>
+                        </a:rPr>
+                        <a:t>add</a:t>
+                      </a:r>
+                      <a:r>
+                        <a:rPr lang="en-US" sz="1600" dirty="0" smtClean="0"/>
+                        <a:t>(</a:t>
+                      </a:r>
+                      <a:r>
+                        <a:rPr lang="en-US" sz="1600" dirty="0" err="1" smtClean="0"/>
+                        <a:t>ReadOnlyTask</a:t>
+                      </a:r>
+                      <a:r>
+                        <a:rPr lang="en-US" sz="1600" dirty="0" smtClean="0"/>
+                        <a:t> </a:t>
+                      </a:r>
+                      <a:r>
+                        <a:rPr lang="en-US" sz="1600" dirty="0" err="1" smtClean="0"/>
+                        <a:t>toAdd</a:t>
+                      </a:r>
+                      <a:r>
+                        <a:rPr lang="en-US" sz="1600" dirty="0" smtClean="0"/>
+                        <a:t>)</a:t>
+                      </a:r>
+                      <a:endParaRPr lang="en-US" sz="1600" baseline="0" dirty="0" smtClean="0"/>
+                    </a:p>
+                    <a:p>
+                      <a:pPr algn="just"/>
+                      <a:r>
+                        <a:rPr lang="en-US" sz="1600" baseline="0" dirty="0" smtClean="0"/>
+                        <a:t>+ </a:t>
+                      </a:r>
+                      <a:r>
+                        <a:rPr lang="en-US" sz="1600" kern="1200" dirty="0" err="1" smtClean="0">
+                          <a:effectLst/>
+                        </a:rPr>
+                        <a:t>setTask</a:t>
+                      </a:r>
+                      <a:r>
+                        <a:rPr lang="en-US" sz="1600" dirty="0" smtClean="0"/>
+                        <a:t>(</a:t>
+                      </a:r>
+                      <a:r>
+                        <a:rPr lang="en-US" sz="1600" dirty="0" err="1" smtClean="0"/>
+                        <a:t>ReadOnlyTask</a:t>
+                      </a:r>
+                      <a:r>
+                        <a:rPr lang="en-US" sz="1600" dirty="0" smtClean="0"/>
+                        <a:t> </a:t>
+                      </a:r>
+                      <a:r>
+                        <a:rPr lang="en-US" sz="1600" dirty="0" smtClean="0"/>
+                        <a:t>target</a:t>
+                      </a:r>
+                      <a:r>
+                        <a:rPr lang="en-US" sz="1600" kern="1200" dirty="0" smtClean="0">
+                          <a:effectLst/>
+                        </a:rPr>
+                        <a:t>, </a:t>
+                      </a:r>
+                      <a:r>
+                        <a:rPr lang="en-US" sz="1600" dirty="0" err="1" smtClean="0"/>
+                        <a:t>ReadOnlyTask</a:t>
+                      </a:r>
+                      <a:r>
+                        <a:rPr lang="en-US" sz="1600" dirty="0" smtClean="0"/>
+                        <a:t> </a:t>
+                      </a:r>
+                      <a:r>
+                        <a:rPr lang="en-US" sz="1600" smtClean="0"/>
+                        <a:t>editeTask)</a:t>
+                      </a:r>
+                      <a:endParaRPr lang="en-US" sz="1600" dirty="0" smtClean="0"/>
+                    </a:p>
+                    <a:p>
+                      <a:pPr algn="just"/>
+                      <a:r>
+                        <a:rPr lang="mr-IN" sz="1600" dirty="0" smtClean="0"/>
+                        <a:t>…</a:t>
+                      </a:r>
+                      <a:endParaRPr lang="en-US" sz="1600" dirty="0"/>
+                    </a:p>
+                  </a:txBody>
+                  <a:tcPr/>
+                </a:tc>
+              </a:tr>
+            </a:tbl>
+          </a:graphicData>
+        </a:graphic>
+      </p:graphicFrame>
+      <p:graphicFrame>
+        <p:nvGraphicFramePr>
+          <p:cNvPr id="22" name="Table 21"/>
+          <p:cNvGraphicFramePr>
+            <a:graphicFrameLocks noGrp="1"/>
+          </p:cNvGraphicFramePr>
+          <p:nvPr>
+            <p:extLst>
+              <p:ext uri="{D42A27DB-BD31-4B8C-83A1-F6EECF244321}">
+                <p14:modId xmlns:p14="http://schemas.microsoft.com/office/powerpoint/2010/main" val="138760256"/>
+              </p:ext>
+            </p:extLst>
+          </p:nvPr>
+        </p:nvGraphicFramePr>
+        <p:xfrm>
+          <a:off x="1312031" y="2623130"/>
+          <a:ext cx="2284070" cy="1112520"/>
+        </p:xfrm>
+        <a:graphic>
+          <a:graphicData uri="http://schemas.openxmlformats.org/drawingml/2006/table">
+            <a:tbl>
+              <a:tblPr firstRow="1" bandRow="1">
+                <a:tableStyleId>{93296810-A885-4BE3-A3E7-6D5BEEA58F35}</a:tableStyleId>
+              </a:tblPr>
+              <a:tblGrid>
+                <a:gridCol w="2284070"/>
+              </a:tblGrid>
+              <a:tr h="370840">
+                <a:tc>
+                  <a:txBody>
+                    <a:bodyPr/>
+                    <a:lstStyle/>
+                    <a:p>
+                      <a:pPr algn="just"/>
+                      <a:r>
+                        <a:rPr lang="en-US" sz="1600" dirty="0" err="1" smtClean="0"/>
+                        <a:t>AddressBookParser</a:t>
+                      </a:r>
+                      <a:endParaRPr lang="en-US" sz="1600" dirty="0"/>
+                    </a:p>
+                  </a:txBody>
+                  <a:tcPr/>
+                </a:tc>
+              </a:tr>
+              <a:tr h="370840">
+                <a:tc>
+                  <a:txBody>
+                    <a:bodyPr/>
+                    <a:lstStyle/>
+                    <a:p>
+                      <a:pPr algn="ctr"/>
+                      <a:r>
+                        <a:rPr lang="mr-IN" dirty="0" smtClean="0"/>
+                        <a:t>…</a:t>
+                      </a:r>
+                      <a:endParaRPr lang="en-US" dirty="0"/>
+                    </a:p>
+                  </a:txBody>
+                  <a:tcPr/>
+                </a:tc>
+              </a:tr>
+              <a:tr h="370840">
+                <a:tc>
+                  <a:txBody>
+                    <a:bodyPr/>
+                    <a:lstStyle/>
+                    <a:p>
+                      <a:pPr algn="ctr"/>
+                      <a:r>
+                        <a:rPr lang="mr-IN" dirty="0" smtClean="0"/>
+                        <a:t>…</a:t>
+                      </a:r>
+                      <a:endParaRPr lang="en-US" dirty="0"/>
+                    </a:p>
+                  </a:txBody>
+                  <a:tcPr/>
+                </a:tc>
+              </a:tr>
+            </a:tbl>
+          </a:graphicData>
+        </a:graphic>
+      </p:graphicFrame>
+      <p:graphicFrame>
+        <p:nvGraphicFramePr>
+          <p:cNvPr id="25" name="Table 24"/>
+          <p:cNvGraphicFramePr>
+            <a:graphicFrameLocks noGrp="1"/>
+          </p:cNvGraphicFramePr>
+          <p:nvPr>
+            <p:extLst>
+              <p:ext uri="{D42A27DB-BD31-4B8C-83A1-F6EECF244321}">
+                <p14:modId xmlns:p14="http://schemas.microsoft.com/office/powerpoint/2010/main" val="1617361026"/>
+              </p:ext>
+            </p:extLst>
+          </p:nvPr>
+        </p:nvGraphicFramePr>
+        <p:xfrm>
+          <a:off x="1329554" y="1137541"/>
+          <a:ext cx="2284070" cy="1112520"/>
+        </p:xfrm>
+        <a:graphic>
+          <a:graphicData uri="http://schemas.openxmlformats.org/drawingml/2006/table">
+            <a:tbl>
+              <a:tblPr firstRow="1" bandRow="1">
+                <a:tableStyleId>{93296810-A885-4BE3-A3E7-6D5BEEA58F35}</a:tableStyleId>
+              </a:tblPr>
+              <a:tblGrid>
+                <a:gridCol w="2284070"/>
+              </a:tblGrid>
+              <a:tr h="370840">
+                <a:tc>
+                  <a:txBody>
+                    <a:bodyPr/>
+                    <a:lstStyle/>
+                    <a:p>
+                      <a:pPr algn="just"/>
+                      <a:r>
+                        <a:rPr lang="en-US" sz="1600" dirty="0" err="1" smtClean="0"/>
+                        <a:t>LogicManager</a:t>
+                      </a:r>
+                      <a:endParaRPr lang="en-US" sz="1600" dirty="0"/>
+                    </a:p>
+                  </a:txBody>
+                  <a:tcPr/>
+                </a:tc>
+              </a:tr>
+              <a:tr h="370840">
+                <a:tc>
+                  <a:txBody>
+                    <a:bodyPr/>
+                    <a:lstStyle/>
+                    <a:p>
+                      <a:pPr algn="ctr"/>
+                      <a:r>
+                        <a:rPr lang="mr-IN" dirty="0" smtClean="0"/>
+                        <a:t>…</a:t>
+                      </a:r>
+                      <a:endParaRPr lang="en-US" dirty="0"/>
+                    </a:p>
+                  </a:txBody>
+                  <a:tcPr/>
+                </a:tc>
+              </a:tr>
+              <a:tr h="370840">
+                <a:tc>
+                  <a:txBody>
+                    <a:bodyPr/>
+                    <a:lstStyle/>
+                    <a:p>
+                      <a:pPr algn="ctr"/>
+                      <a:r>
+                        <a:rPr lang="mr-IN" dirty="0" smtClean="0"/>
+                        <a:t>…</a:t>
+                      </a:r>
+                      <a:endParaRPr lang="en-US" dirty="0"/>
+                    </a:p>
+                  </a:txBody>
+                  <a:tcPr/>
+                </a:tc>
+              </a:tr>
+            </a:tbl>
+          </a:graphicData>
+        </a:graphic>
+      </p:graphicFrame>
+      <p:cxnSp>
+        <p:nvCxnSpPr>
+          <p:cNvPr id="7" name="Straight Arrow Connector 6"/>
+          <p:cNvCxnSpPr>
+            <a:endCxn id="22" idx="0"/>
+          </p:cNvCxnSpPr>
+          <p:nvPr/>
+        </p:nvCxnSpPr>
+        <p:spPr>
+          <a:xfrm>
+            <a:off x="2454066" y="2250061"/>
+            <a:ext cx="0" cy="373069"/>
+          </a:xfrm>
+          <a:prstGeom prst="straightConnector1">
+            <a:avLst/>
+          </a:prstGeom>
+          <a:ln>
+            <a:tailEnd type="triangle"/>
+          </a:ln>
+        </p:spPr>
+        <p:style>
+          <a:lnRef idx="1">
+            <a:schemeClr val="accent1"/>
+          </a:lnRef>
+          <a:fillRef idx="0">
+            <a:schemeClr val="accent1"/>
+          </a:fillRef>
+          <a:effectRef idx="0">
+            <a:schemeClr val="accent1"/>
+          </a:effectRef>
+          <a:fontRef idx="minor">
+            <a:schemeClr val="tx1"/>
+          </a:fontRef>
+        </p:style>
+      </p:cxnSp>
+      <p:cxnSp>
+        <p:nvCxnSpPr>
+          <p:cNvPr id="12" name="Straight Arrow Connector 11"/>
+          <p:cNvCxnSpPr>
+            <a:endCxn id="18" idx="0"/>
+          </p:cNvCxnSpPr>
+          <p:nvPr/>
+        </p:nvCxnSpPr>
+        <p:spPr>
+          <a:xfrm>
+            <a:off x="2454066" y="3735650"/>
+            <a:ext cx="0" cy="439477"/>
+          </a:xfrm>
+          <a:prstGeom prst="straightConnector1">
+            <a:avLst/>
+          </a:prstGeom>
+          <a:ln>
+            <a:tailEnd type="triangle"/>
+          </a:ln>
+        </p:spPr>
+        <p:style>
+          <a:lnRef idx="1">
+            <a:schemeClr val="accent1"/>
+          </a:lnRef>
+          <a:fillRef idx="0">
+            <a:schemeClr val="accent1"/>
+          </a:fillRef>
+          <a:effectRef idx="0">
+            <a:schemeClr val="accent1"/>
+          </a:effectRef>
+          <a:fontRef idx="minor">
+            <a:schemeClr val="tx1"/>
+          </a:fontRef>
+        </p:style>
+      </p:cxnSp>
+      <p:cxnSp>
+        <p:nvCxnSpPr>
+          <p:cNvPr id="29" name="Straight Arrow Connector 28"/>
+          <p:cNvCxnSpPr>
+            <a:endCxn id="16" idx="1"/>
+          </p:cNvCxnSpPr>
+          <p:nvPr/>
+        </p:nvCxnSpPr>
+        <p:spPr>
+          <a:xfrm flipV="1">
+            <a:off x="3596101" y="2760290"/>
+            <a:ext cx="679844" cy="1785678"/>
+          </a:xfrm>
+          <a:prstGeom prst="straightConnector1">
+            <a:avLst/>
+          </a:prstGeom>
+          <a:ln>
+            <a:tailEnd type="triangle"/>
+          </a:ln>
+        </p:spPr>
+        <p:style>
+          <a:lnRef idx="1">
+            <a:schemeClr val="accent1"/>
+          </a:lnRef>
+          <a:fillRef idx="0">
+            <a:schemeClr val="accent1"/>
+          </a:fillRef>
+          <a:effectRef idx="0">
+            <a:schemeClr val="accent1"/>
+          </a:effectRef>
+          <a:fontRef idx="minor">
+            <a:schemeClr val="tx1"/>
+          </a:fontRef>
+        </p:style>
+      </p:cxnSp>
+      <p:cxnSp>
+        <p:nvCxnSpPr>
+          <p:cNvPr id="31" name="Straight Arrow Connector 30"/>
+          <p:cNvCxnSpPr>
+            <a:endCxn id="19" idx="1"/>
+          </p:cNvCxnSpPr>
+          <p:nvPr/>
+        </p:nvCxnSpPr>
+        <p:spPr>
+          <a:xfrm flipV="1">
+            <a:off x="5944597" y="2382198"/>
+            <a:ext cx="697368" cy="468262"/>
+          </a:xfrm>
+          <a:prstGeom prst="straightConnector1">
+            <a:avLst/>
+          </a:prstGeom>
+          <a:ln>
+            <a:tailEnd type="triangle"/>
+          </a:ln>
+        </p:spPr>
+        <p:style>
+          <a:lnRef idx="1">
+            <a:schemeClr val="accent1"/>
+          </a:lnRef>
+          <a:fillRef idx="0">
+            <a:schemeClr val="accent1"/>
+          </a:fillRef>
+          <a:effectRef idx="0">
+            <a:schemeClr val="accent1"/>
+          </a:effectRef>
+          <a:fontRef idx="minor">
+            <a:schemeClr val="tx1"/>
+          </a:fontRef>
+        </p:style>
+      </p:cxnSp>
+      <p:cxnSp>
+        <p:nvCxnSpPr>
+          <p:cNvPr id="33" name="Straight Arrow Connector 32"/>
+          <p:cNvCxnSpPr>
+            <a:stCxn id="19" idx="2"/>
+            <a:endCxn id="20" idx="0"/>
+          </p:cNvCxnSpPr>
+          <p:nvPr/>
+        </p:nvCxnSpPr>
+        <p:spPr>
+          <a:xfrm flipH="1">
+            <a:off x="7425545" y="3626855"/>
+            <a:ext cx="1447522" cy="548272"/>
+          </a:xfrm>
+          <a:prstGeom prst="straightConnector1">
+            <a:avLst/>
+          </a:prstGeom>
+          <a:ln>
+            <a:tailEnd type="triangle"/>
+          </a:ln>
+        </p:spPr>
+        <p:style>
+          <a:lnRef idx="1">
+            <a:schemeClr val="accent1"/>
+          </a:lnRef>
+          <a:fillRef idx="0">
+            <a:schemeClr val="accent1"/>
+          </a:fillRef>
+          <a:effectRef idx="0">
+            <a:schemeClr val="accent1"/>
+          </a:effectRef>
+          <a:fontRef idx="minor">
+            <a:schemeClr val="tx1"/>
+          </a:fontRef>
+        </p:style>
+      </p:cxnSp>
+      <p:sp>
+        <p:nvSpPr>
+          <p:cNvPr id="35" name="TextBox 34"/>
+          <p:cNvSpPr txBox="1"/>
+          <p:nvPr/>
+        </p:nvSpPr>
+        <p:spPr>
+          <a:xfrm>
+            <a:off x="474133" y="393564"/>
+            <a:ext cx="4402667" cy="369332"/>
+          </a:xfrm>
+          <a:prstGeom prst="rect">
+            <a:avLst/>
+          </a:prstGeom>
+        </p:spPr>
+        <p:style>
+          <a:lnRef idx="2">
+            <a:schemeClr val="dk1"/>
+          </a:lnRef>
+          <a:fillRef idx="1">
+            <a:schemeClr val="lt1"/>
+          </a:fillRef>
+          <a:effectRef idx="0">
+            <a:schemeClr val="dk1"/>
+          </a:effectRef>
+          <a:fontRef idx="minor">
+            <a:schemeClr val="dk1"/>
+          </a:fontRef>
+        </p:style>
+        <p:txBody>
+          <a:bodyPr wrap="square" rtlCol="0">
+            <a:spAutoFit/>
+          </a:bodyPr>
+          <a:lstStyle/>
+          <a:p>
+            <a:r>
+              <a:rPr lang="en-US" dirty="0" smtClean="0"/>
+              <a:t>UML Class Diagram for </a:t>
+            </a:r>
+            <a:r>
+              <a:rPr lang="en-US" dirty="0" smtClean="0"/>
+              <a:t>Sorting Tasks</a:t>
+            </a:r>
+            <a:endParaRPr lang="en-US" dirty="0"/>
+          </a:p>
+        </p:txBody>
+      </p:sp>
+    </p:spTree>
+    <p:extLst>
+      <p:ext uri="{BB962C8B-B14F-4D97-AF65-F5344CB8AC3E}">
+        <p14:creationId xmlns:p14="http://schemas.microsoft.com/office/powerpoint/2010/main" val="490268279"/>
+      </p:ext>
+    </p:extLst>
+  </p:cSld>
+  <p:clrMapOvr>
+    <a:masterClrMapping/>
+  </p:clrMapOvr>
+  <p:timing>
+    <p:tnLst>
+      <p:par>
+        <p:cTn id="1" dur="indefinite" restart="never" nodeType="tmRoot"/>
+      </p:par>
+    </p:tnLst>
+  </p:timing>
+</p:sld>
+</file>
+
+<file path=ppt/slides/slide3.xml><?xml version="1.0" encoding="utf-8"?>
+<p:sld xmlns:a="http://schemas.openxmlformats.org/drawingml/2006/main" xmlns:r="http://schemas.openxmlformats.org/officeDocument/2006/relationships" xmlns:p="http://schemas.openxmlformats.org/presentationml/2006/main">
+  <p:cSld>
+    <p:spTree>
+      <p:nvGrpSpPr>
+        <p:cNvPr id="1" name=""/>
+        <p:cNvGrpSpPr/>
+        <p:nvPr/>
+      </p:nvGrpSpPr>
+      <p:grpSpPr>
+        <a:xfrm>
+          <a:off x="0" y="0"/>
+          <a:ext cx="0" cy="0"/>
+          <a:chOff x="0" y="0"/>
+          <a:chExt cx="0" cy="0"/>
+        </a:xfrm>
+      </p:grpSpPr>
+      <p:sp>
+        <p:nvSpPr>
           <p:cNvPr id="16" name="Rectangle 15"/>
           <p:cNvSpPr/>
           <p:nvPr/>
@@ -5123,7 +6251,7 @@
 </p:sld>
 </file>
 
-<file path=ppt/slides/slide3.xml><?xml version="1.0" encoding="utf-8"?>
+<file path=ppt/slides/slide4.xml><?xml version="1.0" encoding="utf-8"?>
 <p:sld xmlns:a="http://schemas.openxmlformats.org/drawingml/2006/main" xmlns:r="http://schemas.openxmlformats.org/officeDocument/2006/relationships" xmlns:p="http://schemas.openxmlformats.org/presentationml/2006/main">
   <p:cSld>
     <p:spTree>

</xml_diff>

<commit_message>
[SORT][DEVDOCS] Updated sort sequence diagram
</commit_message>
<xml_diff>
--- a/docs/diagrams/SortCommandDiagrams.pptx
+++ b/docs/diagrams/SortCommandDiagrams.pptx
@@ -3405,7 +3405,7 @@
           <p:nvPr>
             <p:extLst>
               <p:ext uri="{D42A27DB-BD31-4B8C-83A1-F6EECF244321}">
-                <p14:modId xmlns:p14="http://schemas.microsoft.com/office/powerpoint/2010/main" val="272656417"/>
+                <p14:modId xmlns:p14="http://schemas.microsoft.com/office/powerpoint/2010/main" val="736173605"/>
               </p:ext>
             </p:extLst>
           </p:nvPr>
@@ -3547,7 +3547,7 @@
           <p:nvPr>
             <p:extLst>
               <p:ext uri="{D42A27DB-BD31-4B8C-83A1-F6EECF244321}">
-                <p14:modId xmlns:p14="http://schemas.microsoft.com/office/powerpoint/2010/main" val="1022225629"/>
+                <p14:modId xmlns:p14="http://schemas.microsoft.com/office/powerpoint/2010/main" val="1216488868"/>
               </p:ext>
             </p:extLst>
           </p:nvPr>
@@ -3624,7 +3624,7 @@
           <p:nvPr>
             <p:extLst>
               <p:ext uri="{D42A27DB-BD31-4B8C-83A1-F6EECF244321}">
-                <p14:modId xmlns:p14="http://schemas.microsoft.com/office/powerpoint/2010/main" val="818098485"/>
+                <p14:modId xmlns:p14="http://schemas.microsoft.com/office/powerpoint/2010/main" val="1484085036"/>
               </p:ext>
             </p:extLst>
           </p:nvPr>
@@ -3836,7 +3836,7 @@
           <p:nvPr>
             <p:extLst>
               <p:ext uri="{D42A27DB-BD31-4B8C-83A1-F6EECF244321}">
-                <p14:modId xmlns:p14="http://schemas.microsoft.com/office/powerpoint/2010/main" val="476562815"/>
+                <p14:modId xmlns:p14="http://schemas.microsoft.com/office/powerpoint/2010/main" val="2142123794"/>
               </p:ext>
             </p:extLst>
           </p:nvPr>
@@ -4129,7 +4129,7 @@
           <p:nvPr>
             <p:extLst>
               <p:ext uri="{D42A27DB-BD31-4B8C-83A1-F6EECF244321}">
-                <p14:modId xmlns:p14="http://schemas.microsoft.com/office/powerpoint/2010/main" val="1624712042"/>
+                <p14:modId xmlns:p14="http://schemas.microsoft.com/office/powerpoint/2010/main" val="111263803"/>
               </p:ext>
             </p:extLst>
           </p:nvPr>
@@ -4211,7 +4211,7 @@
           <p:nvPr>
             <p:extLst>
               <p:ext uri="{D42A27DB-BD31-4B8C-83A1-F6EECF244321}">
-                <p14:modId xmlns:p14="http://schemas.microsoft.com/office/powerpoint/2010/main" val="1280718289"/>
+                <p14:modId xmlns:p14="http://schemas.microsoft.com/office/powerpoint/2010/main" val="1699964131"/>
               </p:ext>
             </p:extLst>
           </p:nvPr>
@@ -4591,7 +4591,7 @@
           <p:nvPr>
             <p:extLst>
               <p:ext uri="{D42A27DB-BD31-4B8C-83A1-F6EECF244321}">
-                <p14:modId xmlns:p14="http://schemas.microsoft.com/office/powerpoint/2010/main" val="335908345"/>
+                <p14:modId xmlns:p14="http://schemas.microsoft.com/office/powerpoint/2010/main" val="79296227"/>
               </p:ext>
             </p:extLst>
           </p:nvPr>
@@ -4733,7 +4733,7 @@
           <p:nvPr>
             <p:extLst>
               <p:ext uri="{D42A27DB-BD31-4B8C-83A1-F6EECF244321}">
-                <p14:modId xmlns:p14="http://schemas.microsoft.com/office/powerpoint/2010/main" val="2123865597"/>
+                <p14:modId xmlns:p14="http://schemas.microsoft.com/office/powerpoint/2010/main" val="1291826049"/>
               </p:ext>
             </p:extLst>
           </p:nvPr>
@@ -4810,7 +4810,7 @@
           <p:nvPr>
             <p:extLst>
               <p:ext uri="{D42A27DB-BD31-4B8C-83A1-F6EECF244321}">
-                <p14:modId xmlns:p14="http://schemas.microsoft.com/office/powerpoint/2010/main" val="837359018"/>
+                <p14:modId xmlns:p14="http://schemas.microsoft.com/office/powerpoint/2010/main" val="660734373"/>
               </p:ext>
             </p:extLst>
           </p:nvPr>
@@ -5020,7 +5020,7 @@
           <p:nvPr>
             <p:extLst>
               <p:ext uri="{D42A27DB-BD31-4B8C-83A1-F6EECF244321}">
-                <p14:modId xmlns:p14="http://schemas.microsoft.com/office/powerpoint/2010/main" val="120367043"/>
+                <p14:modId xmlns:p14="http://schemas.microsoft.com/office/powerpoint/2010/main" val="324668374"/>
               </p:ext>
             </p:extLst>
           </p:nvPr>
@@ -5260,8 +5260,12 @@
                         <a:t> </a:t>
                       </a:r>
                       <a:r>
-                        <a:rPr lang="en-US" sz="1600" smtClean="0"/>
-                        <a:t>editeTask)</a:t>
+                        <a:rPr lang="en-US" sz="1600" dirty="0" err="1" smtClean="0"/>
+                        <a:t>editeTask</a:t>
+                      </a:r>
+                      <a:r>
+                        <a:rPr lang="en-US" sz="1600" dirty="0" smtClean="0"/>
+                        <a:t>)</a:t>
                       </a:r>
                       <a:endParaRPr lang="en-US" sz="1600" dirty="0" smtClean="0"/>
                     </a:p>
@@ -5290,7 +5294,7 @@
           <p:nvPr>
             <p:extLst>
               <p:ext uri="{D42A27DB-BD31-4B8C-83A1-F6EECF244321}">
-                <p14:modId xmlns:p14="http://schemas.microsoft.com/office/powerpoint/2010/main" val="138760256"/>
+                <p14:modId xmlns:p14="http://schemas.microsoft.com/office/powerpoint/2010/main" val="2092898438"/>
               </p:ext>
             </p:extLst>
           </p:nvPr>
@@ -5372,7 +5376,7 @@
           <p:nvPr>
             <p:extLst>
               <p:ext uri="{D42A27DB-BD31-4B8C-83A1-F6EECF244321}">
-                <p14:modId xmlns:p14="http://schemas.microsoft.com/office/powerpoint/2010/main" val="1617361026"/>
+                <p14:modId xmlns:p14="http://schemas.microsoft.com/office/powerpoint/2010/main" val="1709393253"/>
               </p:ext>
             </p:extLst>
           </p:nvPr>
@@ -6805,8 +6809,8 @@
         </p:nvSpPr>
         <p:spPr>
           <a:xfrm>
-            <a:off x="1934629" y="1437333"/>
-            <a:ext cx="1160894" cy="400110"/>
+            <a:off x="2010773" y="1437333"/>
+            <a:ext cx="1008609" cy="553998"/>
           </a:xfrm>
           <a:prstGeom prst="rect">
             <a:avLst/>
@@ -6830,7 +6834,18 @@
             <a:pPr algn="ctr"/>
             <a:r>
               <a:rPr lang="en-US" sz="1000" dirty="0" smtClean="0"/>
-              <a:t>(“sort name </a:t>
+              <a:t>(“sort </a:t>
+            </a:r>
+            <a:r>
+              <a:rPr lang="en-US" sz="1000" dirty="0" smtClean="0"/>
+              <a:t>list </a:t>
+            </a:r>
+          </a:p>
+          <a:p>
+            <a:pPr algn="ctr"/>
+            <a:r>
+              <a:rPr lang="en-US" sz="1000" dirty="0" smtClean="0"/>
+              <a:t>name </a:t>
             </a:r>
             <a:r>
               <a:rPr lang="en-US" sz="1000" dirty="0" err="1" smtClean="0"/>
@@ -6885,8 +6900,8 @@
         </p:nvSpPr>
         <p:spPr>
           <a:xfrm>
-            <a:off x="5385966" y="1700978"/>
-            <a:ext cx="936475" cy="400110"/>
+            <a:off x="5329060" y="1700978"/>
+            <a:ext cx="1050288" cy="400110"/>
           </a:xfrm>
           <a:prstGeom prst="rect">
             <a:avLst/>
@@ -6910,7 +6925,11 @@
             <a:pPr algn="ctr"/>
             <a:r>
               <a:rPr lang="en-US" sz="1000" dirty="0" smtClean="0"/>
-              <a:t>(field, order)</a:t>
+              <a:t>(list, field</a:t>
+            </a:r>
+            <a:r>
+              <a:rPr lang="en-US" sz="1000" dirty="0" smtClean="0"/>
+              <a:t>, order)</a:t>
             </a:r>
             <a:endParaRPr lang="en-US" sz="1000" dirty="0"/>
           </a:p>
@@ -7341,8 +7360,8 @@
         </p:nvSpPr>
         <p:spPr>
           <a:xfrm>
-            <a:off x="8479626" y="3344694"/>
-            <a:ext cx="1766830" cy="246221"/>
+            <a:off x="8459588" y="3344694"/>
+            <a:ext cx="1806906" cy="246221"/>
           </a:xfrm>
           <a:prstGeom prst="rect">
             <a:avLst/>
@@ -7369,8 +7388,8 @@
               <a:t>desc</a:t>
             </a:r>
             <a:r>
-              <a:rPr lang="en-US" sz="1000" dirty="0" smtClean="0"/>
-              <a:t>”</a:t>
+              <a:rPr lang="en-US" sz="1000" smtClean="0"/>
+              <a:t>”)</a:t>
             </a:r>
             <a:endParaRPr lang="en-US" sz="1000" dirty="0"/>
           </a:p>

</xml_diff>